<commit_message>
tweaks to L7.3, ps07:
</commit_message>
<xml_diff>
--- a/Slides/Lesson 7.3 Case Study-- Free Variables.pptx
+++ b/Slides/Lesson 7.3 Case Study-- Free Variables.pptx
@@ -5,7 +5,7 @@
     <p:sldMasterId id="2147483690" r:id="rId1"/>
   </p:sldMasterIdLst>
   <p:notesMasterIdLst>
-    <p:notesMasterId r:id="rId17"/>
+    <p:notesMasterId r:id="rId19"/>
   </p:notesMasterIdLst>
   <p:sldIdLst>
     <p:sldId id="271" r:id="rId2"/>
@@ -13,21 +13,23 @@
     <p:sldId id="364" r:id="rId4"/>
     <p:sldId id="365" r:id="rId5"/>
     <p:sldId id="366" r:id="rId6"/>
-    <p:sldId id="382" r:id="rId7"/>
-    <p:sldId id="367" r:id="rId8"/>
-    <p:sldId id="368" r:id="rId9"/>
-    <p:sldId id="381" r:id="rId10"/>
-    <p:sldId id="370" r:id="rId11"/>
-    <p:sldId id="371" r:id="rId12"/>
-    <p:sldId id="383" r:id="rId13"/>
-    <p:sldId id="372" r:id="rId14"/>
-    <p:sldId id="373" r:id="rId15"/>
-    <p:sldId id="379" r:id="rId16"/>
+    <p:sldId id="384" r:id="rId7"/>
+    <p:sldId id="385" r:id="rId8"/>
+    <p:sldId id="382" r:id="rId9"/>
+    <p:sldId id="367" r:id="rId10"/>
+    <p:sldId id="368" r:id="rId11"/>
+    <p:sldId id="381" r:id="rId12"/>
+    <p:sldId id="370" r:id="rId13"/>
+    <p:sldId id="371" r:id="rId14"/>
+    <p:sldId id="383" r:id="rId15"/>
+    <p:sldId id="372" r:id="rId16"/>
+    <p:sldId id="373" r:id="rId17"/>
+    <p:sldId id="379" r:id="rId18"/>
   </p:sldIdLst>
   <p:sldSz cx="9144000" cy="6858000" type="screen4x3"/>
   <p:notesSz cx="6858000" cy="9144000"/>
   <p:custDataLst>
-    <p:tags r:id="rId18"/>
+    <p:tags r:id="rId20"/>
   </p:custDataLst>
   <p:defaultTextStyle>
     <a:defPPr>
@@ -226,7 +228,7 @@
             <a:fld id="{5758D54E-DB71-49E8-BB66-48EF417974F5}" type="datetimeFigureOut">
               <a:rPr lang="en-US" smtClean="0"/>
               <a:pPr/>
-              <a:t>9/28/2015</a:t>
+              <a:t>10/25/2015</a:t>
             </a:fld>
             <a:endParaRPr lang="en-US"/>
           </a:p>
@@ -763,7 +765,7 @@
           <a:p>
             <a:fld id="{2F1F79F5-7BEC-496A-AFC7-876E38F64D71}" type="datetime1">
               <a:rPr lang="en-US" smtClean="0"/>
-              <a:t>9/28/2015</a:t>
+              <a:t>10/25/2015</a:t>
             </a:fld>
             <a:endParaRPr lang="en-US"/>
           </a:p>
@@ -865,7 +867,7 @@
           <a:p>
             <a:fld id="{0A05703A-7669-4FEA-9056-25299B4D29D4}" type="datetime1">
               <a:rPr lang="en-US" smtClean="0"/>
-              <a:t>9/28/2015</a:t>
+              <a:t>10/25/2015</a:t>
             </a:fld>
             <a:endParaRPr lang="en-US"/>
           </a:p>
@@ -1142,7 +1144,7 @@
           <a:p>
             <a:fld id="{6E5077B5-BB57-49DB-88CA-226A139E5C01}" type="datetime1">
               <a:rPr lang="en-US" smtClean="0"/>
-              <a:t>9/28/2015</a:t>
+              <a:t>10/25/2015</a:t>
             </a:fld>
             <a:endParaRPr lang="en-US"/>
           </a:p>
@@ -1395,7 +1397,7 @@
           <a:p>
             <a:fld id="{C48D9447-CBD6-49A1-89FD-8512A8CF8999}" type="datetime1">
               <a:rPr lang="en-US" smtClean="0"/>
-              <a:t>9/28/2015</a:t>
+              <a:t>10/25/2015</a:t>
             </a:fld>
             <a:endParaRPr lang="en-US"/>
           </a:p>
@@ -1565,7 +1567,7 @@
           <a:p>
             <a:fld id="{A3639A2A-823D-48B7-9ACE-7FAF42870BA9}" type="datetime1">
               <a:rPr lang="en-US" smtClean="0"/>
-              <a:t>9/28/2015</a:t>
+              <a:t>10/25/2015</a:t>
             </a:fld>
             <a:endParaRPr lang="en-US"/>
           </a:p>
@@ -1745,7 +1747,7 @@
           <a:p>
             <a:fld id="{ED1B6996-82E9-463C-972C-7B56056E426C}" type="datetime1">
               <a:rPr lang="en-US" smtClean="0"/>
-              <a:t>9/28/2015</a:t>
+              <a:t>10/25/2015</a:t>
             </a:fld>
             <a:endParaRPr lang="en-US"/>
           </a:p>
@@ -1928,7 +1930,7 @@
           <a:p>
             <a:fld id="{E22ED4DA-448D-4BB1-B935-CC112220207B}" type="datetime1">
               <a:rPr lang="en-US" smtClean="0"/>
-              <a:t>9/28/2015</a:t>
+              <a:t>10/25/2015</a:t>
             </a:fld>
             <a:endParaRPr lang="en-US"/>
           </a:p>
@@ -2110,7 +2112,7 @@
           <a:p>
             <a:fld id="{E22ED4DA-448D-4BB1-B935-CC112220207B}" type="datetime1">
               <a:rPr lang="en-US" smtClean="0"/>
-              <a:t>9/28/2015</a:t>
+              <a:t>10/25/2015</a:t>
             </a:fld>
             <a:endParaRPr lang="en-US"/>
           </a:p>
@@ -2379,7 +2381,7 @@
           <a:p>
             <a:fld id="{FF5D65A6-AB94-4435-B0B7-3743215FA46C}" type="datetime1">
               <a:rPr lang="en-US" smtClean="0"/>
-              <a:t>9/28/2015</a:t>
+              <a:t>10/25/2015</a:t>
             </a:fld>
             <a:endParaRPr lang="en-US"/>
           </a:p>
@@ -2564,7 +2566,7 @@
           <a:p>
             <a:fld id="{FF5D65A6-AB94-4435-B0B7-3743215FA46C}" type="datetime1">
               <a:rPr lang="en-US" smtClean="0"/>
-              <a:t>9/28/2015</a:t>
+              <a:t>10/25/2015</a:t>
             </a:fld>
             <a:endParaRPr lang="en-US"/>
           </a:p>
@@ -2866,7 +2868,7 @@
           <a:p>
             <a:fld id="{7C193DC4-6EF0-48C9-B29C-616106A645E1}" type="datetime1">
               <a:rPr lang="en-US" smtClean="0"/>
-              <a:t>9/28/2015</a:t>
+              <a:t>10/25/2015</a:t>
             </a:fld>
             <a:endParaRPr lang="en-US"/>
           </a:p>
@@ -3154,7 +3156,7 @@
           <a:p>
             <a:fld id="{5D1846AD-9252-4647-9435-4C2AC365653A}" type="datetime1">
               <a:rPr lang="en-US" smtClean="0"/>
-              <a:t>9/28/2015</a:t>
+              <a:t>10/25/2015</a:t>
             </a:fld>
             <a:endParaRPr lang="en-US"/>
           </a:p>
@@ -3576,7 +3578,7 @@
           <a:p>
             <a:fld id="{CE56DC10-3561-4063-A6AF-C1CC7A41040A}" type="datetime1">
               <a:rPr lang="en-US" smtClean="0"/>
-              <a:t>9/28/2015</a:t>
+              <a:t>10/25/2015</a:t>
             </a:fld>
             <a:endParaRPr lang="en-US"/>
           </a:p>
@@ -3694,7 +3696,7 @@
           <a:p>
             <a:fld id="{2F7B77F5-1464-4F6B-92A8-64FC8A508293}" type="datetime1">
               <a:rPr lang="en-US" smtClean="0"/>
-              <a:t>9/28/2015</a:t>
+              <a:t>10/25/2015</a:t>
             </a:fld>
             <a:endParaRPr lang="en-US"/>
           </a:p>
@@ -3926,7 +3928,7 @@
           <a:p>
             <a:fld id="{02B3F677-983B-48DB-ADFD-63FE6CBC7FB2}" type="datetime1">
               <a:rPr lang="en-US" smtClean="0"/>
-              <a:t>9/28/2015</a:t>
+              <a:t>10/25/2015</a:t>
             </a:fld>
             <a:endParaRPr lang="en-US"/>
           </a:p>
@@ -4625,21 +4627,13 @@
         <p:spPr/>
         <p:txBody>
           <a:bodyPr>
-            <a:normAutofit fontScale="90000"/>
+            <a:normAutofit/>
           </a:bodyPr>
           <a:lstStyle/>
           <a:p>
             <a:r>
               <a:rPr lang="en-US" dirty="0" smtClean="0"/>
-              <a:t>What </a:t>
-            </a:r>
-            <a:r>
-              <a:rPr lang="en-US" dirty="0" smtClean="0"/>
-              <a:t>happens as </a:t>
-            </a:r>
-            <a:r>
-              <a:rPr lang="en-US" dirty="0" smtClean="0"/>
-              <a:t>we descend into the structure?</a:t>
+              <a:t>Contract &amp; purpose statement</a:t>
             </a:r>
             <a:endParaRPr lang="en-US" dirty="0"/>
           </a:p>
@@ -4663,37 +4657,86 @@
           <a:lstStyle/>
           <a:p>
             <a:r>
-              <a:rPr lang="en-US" dirty="0" smtClean="0"/>
-              <a:t>We lose information about which lambda-variables are above us.</a:t>
-            </a:r>
-          </a:p>
-          <a:p>
-            <a:r>
-              <a:rPr lang="en-US" dirty="0" smtClean="0"/>
-              <a:t>So we'll add a context variable to keep track of the lambda-variables above us</a:t>
-            </a:r>
-          </a:p>
-          <a:p>
-            <a:pPr lvl="1"/>
-            <a:r>
-              <a:rPr lang="en-US" dirty="0" smtClean="0"/>
-              <a:t>when we hit a variable, see if it's already in this list.  If so, it's not free in the whole expression. </a:t>
-            </a:r>
-          </a:p>
-          <a:p>
-            <a:pPr lvl="1"/>
-            <a:r>
-              <a:rPr lang="en-US" dirty="0" smtClean="0"/>
-              <a:t>This is like </a:t>
-            </a:r>
-            <a:r>
-              <a:rPr lang="en-US" dirty="0" smtClean="0"/>
-              <a:t>the counter in </a:t>
-            </a:r>
-            <a:r>
-              <a:rPr lang="en-US" b="1" dirty="0" smtClean="0"/>
-              <a:t>mark-depth</a:t>
-            </a:r>
+              <a:rPr lang="en-US" sz="2400" dirty="0" smtClean="0"/>
+              <a:t>;; free-</a:t>
+            </a:r>
+            <a:r>
+              <a:rPr lang="en-US" sz="2400" dirty="0" err="1" smtClean="0"/>
+              <a:t>vars</a:t>
+            </a:r>
+            <a:r>
+              <a:rPr lang="en-US" sz="2400" dirty="0" smtClean="0"/>
+              <a:t> : </a:t>
+            </a:r>
+            <a:r>
+              <a:rPr lang="en-US" sz="2400" dirty="0" err="1" smtClean="0"/>
+              <a:t>FredExp</a:t>
+            </a:r>
+            <a:r>
+              <a:rPr lang="en-US" sz="2400" dirty="0" smtClean="0"/>
+              <a:t> -&gt; </a:t>
+            </a:r>
+            <a:r>
+              <a:rPr lang="en-US" sz="2400" dirty="0" err="1" smtClean="0"/>
+              <a:t>SetOfSymbol</a:t>
+            </a:r>
+            <a:endParaRPr lang="en-US" sz="2400" dirty="0" smtClean="0"/>
+          </a:p>
+          <a:p>
+            <a:r>
+              <a:rPr lang="en-US" sz="2400" dirty="0" smtClean="0"/>
+              <a:t>;; Produces the set of names that occur free in the given </a:t>
+            </a:r>
+            <a:r>
+              <a:rPr lang="en-US" sz="2400" dirty="0" err="1" smtClean="0"/>
+              <a:t>FredExp</a:t>
+            </a:r>
+            <a:endParaRPr lang="en-US" sz="2400" dirty="0" smtClean="0"/>
+          </a:p>
+          <a:p>
+            <a:r>
+              <a:rPr lang="en-US" sz="2400" dirty="0" smtClean="0"/>
+              <a:t>;; EXAMPLE:</a:t>
+            </a:r>
+          </a:p>
+          <a:p>
+            <a:r>
+              <a:rPr lang="en-US" sz="2400" dirty="0" smtClean="0"/>
+              <a:t>;; (free-</a:t>
+            </a:r>
+            <a:r>
+              <a:rPr lang="en-US" sz="2400" dirty="0" err="1" smtClean="0"/>
+              <a:t>vars</a:t>
+            </a:r>
+            <a:r>
+              <a:rPr lang="en-US" sz="2400" dirty="0" smtClean="0"/>
+              <a:t> (z (lambda (x) (x y)))) = {y, z}</a:t>
+            </a:r>
+          </a:p>
+          <a:p>
+            <a:r>
+              <a:rPr lang="en-US" sz="2400" dirty="0" smtClean="0"/>
+              <a:t>;; strategy: Use template for </a:t>
+            </a:r>
+            <a:r>
+              <a:rPr lang="en-US" sz="2400" dirty="0" err="1" smtClean="0"/>
+              <a:t>FredExp</a:t>
+            </a:r>
+            <a:endParaRPr lang="en-US" sz="2400" dirty="0" smtClean="0"/>
+          </a:p>
+          <a:p>
+            <a:endParaRPr lang="en-US" sz="2400" dirty="0" smtClean="0"/>
+          </a:p>
+          <a:p>
+            <a:r>
+              <a:rPr lang="en-US" b="0" dirty="0" smtClean="0">
+                <a:latin typeface="+mn-lt"/>
+              </a:rPr>
+              <a:t>We will represent sets as lists without duplication, as in sets.rkt.</a:t>
+            </a:r>
+            <a:endParaRPr lang="en-US" b="0" dirty="0">
+              <a:latin typeface="+mn-lt"/>
+            </a:endParaRPr>
           </a:p>
         </p:txBody>
       </p:sp>
@@ -4723,7 +4766,7 @@
               <a:pPr/>
               <a:t>10</a:t>
             </a:fld>
-            <a:endParaRPr lang="en-US" dirty="0">
+            <a:endParaRPr lang="en-US">
               <a:solidFill>
                 <a:prstClr val="black">
                   <a:tint val="75000"/>
@@ -4736,7 +4779,7 @@
     </p:spTree>
     <p:extLst>
       <p:ext uri="{BB962C8B-B14F-4D97-AF65-F5344CB8AC3E}">
-        <p14:creationId xmlns:p14="http://schemas.microsoft.com/office/powerpoint/2010/main" val="3518516738"/>
+        <p14:creationId xmlns:p14="http://schemas.microsoft.com/office/powerpoint/2010/main" val="4258390618"/>
       </p:ext>
     </p:extLst>
   </p:cSld>
@@ -4772,7 +4815,7 @@
       </p:grpSpPr>
       <p:sp>
         <p:nvSpPr>
-          <p:cNvPr id="2" name="Title 1"/>
+          <p:cNvPr id="6" name="Title 5"/>
           <p:cNvSpPr>
             <a:spLocks noGrp="1"/>
           </p:cNvSpPr>
@@ -4787,7 +4830,7 @@
           <a:p>
             <a:r>
               <a:rPr lang="en-US" dirty="0" smtClean="0"/>
-              <a:t>With context variable</a:t>
+              <a:t>Here's the template again</a:t>
             </a:r>
             <a:endParaRPr lang="en-US" dirty="0"/>
           </a:p>
@@ -4795,7 +4838,7 @@
       </p:sp>
       <p:sp>
         <p:nvSpPr>
-          <p:cNvPr id="3" name="Content Placeholder 2"/>
+          <p:cNvPr id="7" name="Content Placeholder 6"/>
           <p:cNvSpPr>
             <a:spLocks noGrp="1"/>
           </p:cNvSpPr>
@@ -4806,36 +4849,21 @@
         <p:spPr/>
         <p:txBody>
           <a:bodyPr>
-            <a:normAutofit fontScale="70000" lnSpcReduction="20000"/>
+            <a:normAutofit fontScale="77500" lnSpcReduction="20000"/>
           </a:bodyPr>
           <a:lstStyle/>
           <a:p>
             <a:r>
               <a:rPr lang="en-US" dirty="0"/>
-              <a:t>;; free-</a:t>
+              <a:t>;; </a:t>
             </a:r>
             <a:r>
               <a:rPr lang="en-US" dirty="0" err="1"/>
-              <a:t>vars</a:t>
+              <a:t>fredexp-fn</a:t>
             </a:r>
             <a:r>
               <a:rPr lang="en-US" dirty="0"/>
-              <a:t>-in-</a:t>
-            </a:r>
-            <a:r>
-              <a:rPr lang="en-US" dirty="0" err="1"/>
-              <a:t>subexp</a:t>
-            </a:r>
-            <a:r>
-              <a:rPr lang="en-US" dirty="0"/>
-              <a:t> </a:t>
-            </a:r>
-            <a:endParaRPr lang="en-US" dirty="0" smtClean="0"/>
-          </a:p>
-          <a:p>
-            <a:r>
-              <a:rPr lang="en-US" dirty="0" smtClean="0"/>
-              <a:t>;;   : </a:t>
+              <a:t> : </a:t>
             </a:r>
             <a:r>
               <a:rPr lang="en-US" dirty="0" err="1"/>
@@ -4843,269 +4871,151 @@
             </a:r>
             <a:r>
               <a:rPr lang="en-US" dirty="0"/>
-              <a:t> </a:t>
-            </a:r>
-            <a:r>
-              <a:rPr lang="en-US" dirty="0" err="1" smtClean="0"/>
-              <a:t>ListOfSymbol</a:t>
-            </a:r>
-            <a:r>
-              <a:rPr lang="en-US" dirty="0" smtClean="0"/>
-              <a:t> </a:t>
-            </a:r>
+              <a:t> -&gt; ?</a:t>
+            </a:r>
+          </a:p>
+          <a:p>
             <a:r>
               <a:rPr lang="en-US" dirty="0"/>
-              <a:t>-&gt; </a:t>
-            </a:r>
-            <a:r>
-              <a:rPr lang="en-US" dirty="0" err="1" smtClean="0"/>
-              <a:t>SetOfSymbol</a:t>
+              <a:t>#;</a:t>
+            </a:r>
+          </a:p>
+          <a:p>
+            <a:r>
+              <a:rPr lang="en-US" dirty="0"/>
+              <a:t>(define (</a:t>
+            </a:r>
+            <a:r>
+              <a:rPr lang="en-US" dirty="0" err="1"/>
+              <a:t>fredexp-fn</a:t>
+            </a:r>
+            <a:r>
+              <a:rPr lang="en-US" dirty="0"/>
+              <a:t> f)</a:t>
+            </a:r>
+          </a:p>
+          <a:p>
+            <a:r>
+              <a:rPr lang="en-US" dirty="0"/>
+              <a:t>  (</a:t>
+            </a:r>
+            <a:r>
+              <a:rPr lang="en-US" dirty="0" err="1"/>
+              <a:t>cond</a:t>
             </a:r>
             <a:endParaRPr lang="en-US" dirty="0"/>
           </a:p>
           <a:p>
             <a:r>
               <a:rPr lang="en-US" dirty="0"/>
-              <a:t>;; GIVEN: a </a:t>
+              <a:t>    [(</a:t>
             </a:r>
             <a:r>
               <a:rPr lang="en-US" dirty="0" err="1"/>
-              <a:t>FredExp</a:t>
+              <a:t>var</a:t>
             </a:r>
             <a:r>
               <a:rPr lang="en-US" dirty="0"/>
-              <a:t> </a:t>
-            </a:r>
-            <a:r>
-              <a:rPr lang="en-US" dirty="0">
-                <a:solidFill>
-                  <a:srgbClr val="FF0000"/>
-                </a:solidFill>
-              </a:rPr>
-              <a:t>f</a:t>
+              <a:t>? f) (... (</a:t>
+            </a:r>
+            <a:r>
+              <a:rPr lang="en-US" dirty="0" err="1"/>
+              <a:t>var</a:t>
             </a:r>
             <a:r>
               <a:rPr lang="en-US" dirty="0"/>
-              <a:t> that is part of </a:t>
-            </a:r>
-            <a:r>
-              <a:rPr lang="en-US" dirty="0" smtClean="0"/>
-              <a:t>some </a:t>
-            </a:r>
+              <a:t>-name f))]</a:t>
+            </a:r>
+          </a:p>
+          <a:p>
             <a:r>
               <a:rPr lang="en-US" dirty="0"/>
-              <a:t>larger </a:t>
-            </a:r>
-            <a:endParaRPr lang="en-US" dirty="0" smtClean="0"/>
-          </a:p>
-          <a:p>
-            <a:r>
-              <a:rPr lang="en-US" dirty="0" smtClean="0"/>
-              <a:t>;;   </a:t>
-            </a:r>
-            <a:r>
-              <a:rPr lang="en-US" dirty="0" err="1" smtClean="0"/>
-              <a:t>FredExp</a:t>
-            </a:r>
-            <a:r>
-              <a:rPr lang="en-US" dirty="0" smtClean="0"/>
-              <a:t> </a:t>
-            </a:r>
-            <a:r>
-              <a:rPr lang="en-US" dirty="0" smtClean="0">
-                <a:solidFill>
-                  <a:srgbClr val="FFC000"/>
-                </a:solidFill>
-              </a:rPr>
-              <a:t>f0</a:t>
-            </a:r>
-            <a:r>
-              <a:rPr lang="en-US" dirty="0" smtClean="0"/>
-              <a:t>, and a </a:t>
-            </a:r>
-            <a:r>
-              <a:rPr lang="en-US" dirty="0" err="1" smtClean="0"/>
-              <a:t>ListOfSymbol</a:t>
-            </a:r>
-            <a:r>
-              <a:rPr lang="en-US" dirty="0" smtClean="0"/>
-              <a:t> </a:t>
-            </a:r>
-            <a:r>
-              <a:rPr lang="en-US" dirty="0" err="1" smtClean="0">
-                <a:solidFill>
-                  <a:srgbClr val="FF0000"/>
-                </a:solidFill>
-              </a:rPr>
-              <a:t>bvars</a:t>
-            </a:r>
-            <a:endParaRPr lang="en-US" dirty="0">
-              <a:solidFill>
-                <a:srgbClr val="FF0000"/>
-              </a:solidFill>
-            </a:endParaRPr>
+              <a:t>    [(lam? f) (...</a:t>
+            </a:r>
           </a:p>
           <a:p>
             <a:r>
               <a:rPr lang="en-US" dirty="0"/>
-              <a:t>;; WHERE: </a:t>
-            </a:r>
-            <a:r>
-              <a:rPr lang="en-US" dirty="0" err="1" smtClean="0"/>
-              <a:t>bvars</a:t>
-            </a:r>
-            <a:r>
-              <a:rPr lang="en-US" dirty="0" smtClean="0"/>
-              <a:t> </a:t>
+              <a:t>                (lam-</a:t>
+            </a:r>
+            <a:r>
+              <a:rPr lang="en-US" dirty="0" err="1"/>
+              <a:t>var</a:t>
             </a:r>
             <a:r>
               <a:rPr lang="en-US" dirty="0"/>
-              <a:t>is the list of symbols that occur </a:t>
-            </a:r>
-            <a:r>
-              <a:rPr lang="en-US" dirty="0" smtClean="0"/>
-              <a:t>in</a:t>
-            </a:r>
-          </a:p>
-          <a:p>
-            <a:r>
-              <a:rPr lang="en-US" dirty="0" smtClean="0"/>
-              <a:t>;;   </a:t>
-            </a:r>
+              <a:t> f)</a:t>
+            </a:r>
+          </a:p>
+          <a:p>
             <a:r>
               <a:rPr lang="en-US" dirty="0"/>
-              <a:t>lambdas above </a:t>
-            </a:r>
-            <a:r>
-              <a:rPr lang="en-US" dirty="0">
-                <a:solidFill>
-                  <a:srgbClr val="FF0000"/>
-                </a:solidFill>
-              </a:rPr>
-              <a:t>f</a:t>
+              <a:t>                (</a:t>
+            </a:r>
+            <a:r>
+              <a:rPr lang="en-US" dirty="0" err="1"/>
+              <a:t>fredexp-fn</a:t>
             </a:r>
             <a:r>
               <a:rPr lang="en-US" dirty="0"/>
-              <a:t> </a:t>
-            </a:r>
-            <a:r>
-              <a:rPr lang="en-US" dirty="0" smtClean="0"/>
-              <a:t>in </a:t>
-            </a:r>
-            <a:r>
-              <a:rPr lang="en-US" dirty="0">
-                <a:solidFill>
-                  <a:srgbClr val="FFC000"/>
-                </a:solidFill>
-              </a:rPr>
-              <a:t>f0</a:t>
+              <a:t> (lam-body f)))]</a:t>
             </a:r>
           </a:p>
           <a:p>
             <a:r>
               <a:rPr lang="en-US" dirty="0"/>
-              <a:t>;; RETURNS: the set of symbols from </a:t>
-            </a:r>
-            <a:r>
-              <a:rPr lang="en-US" dirty="0">
-                <a:solidFill>
-                  <a:srgbClr val="FF0000"/>
-                </a:solidFill>
-              </a:rPr>
-              <a:t>f</a:t>
-            </a:r>
+              <a:t>    [(app? f) (...</a:t>
+            </a:r>
+          </a:p>
+          <a:p>
             <a:r>
               <a:rPr lang="en-US" dirty="0"/>
-              <a:t> that are </a:t>
-            </a:r>
-            <a:r>
-              <a:rPr lang="en-US" dirty="0" smtClean="0"/>
-              <a:t>free</a:t>
-            </a:r>
-          </a:p>
-          <a:p>
-            <a:r>
-              <a:rPr lang="en-US" dirty="0" smtClean="0"/>
-              <a:t>;;   </a:t>
+              <a:t>                (</a:t>
+            </a:r>
+            <a:r>
+              <a:rPr lang="en-US" dirty="0" err="1"/>
+              <a:t>fredexp-fn</a:t>
             </a:r>
             <a:r>
               <a:rPr lang="en-US" dirty="0"/>
-              <a:t>in </a:t>
-            </a:r>
-            <a:r>
-              <a:rPr lang="en-US" dirty="0">
-                <a:solidFill>
-                  <a:srgbClr val="FFC000"/>
-                </a:solidFill>
-              </a:rPr>
-              <a:t>f0</a:t>
+              <a:t> (app-</a:t>
+            </a:r>
+            <a:r>
+              <a:rPr lang="en-US" dirty="0" err="1"/>
+              <a:t>fn</a:t>
             </a:r>
             <a:r>
               <a:rPr lang="en-US" dirty="0"/>
-              <a:t>.</a:t>
-            </a:r>
-          </a:p>
-          <a:p>
-            <a:endParaRPr lang="en-US" dirty="0"/>
+              <a:t> f))</a:t>
+            </a:r>
           </a:p>
           <a:p>
             <a:r>
               <a:rPr lang="en-US" dirty="0"/>
-              <a:t>;; EXAMPLE: </a:t>
-            </a:r>
-          </a:p>
-          <a:p>
+              <a:t>                (</a:t>
+            </a:r>
+            <a:r>
+              <a:rPr lang="en-US" dirty="0" err="1"/>
+              <a:t>fredexp-fn</a:t>
+            </a:r>
             <a:r>
               <a:rPr lang="en-US" dirty="0"/>
-              <a:t>;; (free-</a:t>
+              <a:t> (app-</a:t>
             </a:r>
             <a:r>
               <a:rPr lang="en-US" dirty="0" err="1"/>
-              <a:t>vars</a:t>
+              <a:t>arg</a:t>
             </a:r>
             <a:r>
               <a:rPr lang="en-US" dirty="0"/>
-              <a:t>-in-</a:t>
-            </a:r>
-            <a:r>
-              <a:rPr lang="en-US" dirty="0" err="1"/>
-              <a:t>subexp</a:t>
-            </a:r>
-            <a:r>
-              <a:rPr lang="en-US" dirty="0"/>
-              <a:t> </a:t>
-            </a:r>
-            <a:endParaRPr lang="en-US" dirty="0" smtClean="0"/>
-          </a:p>
-          <a:p>
-            <a:r>
-              <a:rPr lang="en-US" dirty="0" smtClean="0"/>
-              <a:t>;;   (</a:t>
-            </a:r>
-            <a:r>
-              <a:rPr lang="en-US" dirty="0"/>
-              <a:t>z (lambda (x) (x y))) (list z)) </a:t>
-            </a:r>
-            <a:endParaRPr lang="en-US" dirty="0" smtClean="0"/>
-          </a:p>
-          <a:p>
-            <a:r>
-              <a:rPr lang="en-US" dirty="0" smtClean="0"/>
-              <a:t>;; = </a:t>
-            </a:r>
-            <a:r>
-              <a:rPr lang="en-US" dirty="0"/>
-              <a:t>(list y) </a:t>
-            </a:r>
-          </a:p>
-          <a:p>
-            <a:endParaRPr lang="en-US" dirty="0"/>
-          </a:p>
-        </p:txBody>
-      </p:sp>
-      <p:sp>
-        <p:nvSpPr>
-          <p:cNvPr id="5" name="Slide Number Placeholder 4"/>
+              <a:t> f)))]))</a:t>
+            </a:r>
+          </a:p>
+        </p:txBody>
+      </p:sp>
+      <p:sp>
+        <p:nvSpPr>
+          <p:cNvPr id="3" name="Slide Number Placeholder 2"/>
           <p:cNvSpPr>
             <a:spLocks noGrp="1"/>
           </p:cNvSpPr>
@@ -5141,14 +5051,14 @@
       </p:sp>
       <p:sp>
         <p:nvSpPr>
-          <p:cNvPr id="4" name="Rectangle 3"/>
+          <p:cNvPr id="5" name="Rectangle 4"/>
           <p:cNvSpPr/>
           <p:nvPr/>
         </p:nvSpPr>
         <p:spPr>
           <a:xfrm>
-            <a:off x="4995797" y="4038600"/>
-            <a:ext cx="3657600" cy="990600"/>
+            <a:off x="6553200" y="2133600"/>
+            <a:ext cx="2362200" cy="1601787"/>
           </a:xfrm>
           <a:prstGeom prst="rect">
             <a:avLst/>
@@ -5186,30 +5096,14 @@
           <a:p>
             <a:pPr algn="ctr"/>
             <a:r>
-              <a:rPr lang="en-US" dirty="0" smtClean="0">
+              <a:rPr lang="en-US" sz="2400" dirty="0" smtClean="0">
                 <a:solidFill>
                   <a:schemeClr val="tx1"/>
                 </a:solidFill>
               </a:rPr>
-              <a:t>The invariant (</a:t>
-            </a:r>
-            <a:r>
-              <a:rPr lang="en-US" b="1" dirty="0" smtClean="0">
-                <a:solidFill>
-                  <a:schemeClr val="tx1"/>
-                </a:solidFill>
-              </a:rPr>
-              <a:t>WHERE</a:t>
-            </a:r>
-            <a:r>
-              <a:rPr lang="en-US" dirty="0" smtClean="0">
-                <a:solidFill>
-                  <a:schemeClr val="tx1"/>
-                </a:solidFill>
-              </a:rPr>
-              <a:t> clause) gives an interpretation for the context variable</a:t>
-            </a:r>
-            <a:endParaRPr lang="en-US" dirty="0">
+              <a:t>What happens as we descend into the structure?</a:t>
+            </a:r>
+            <a:endParaRPr lang="en-US" sz="2400" dirty="0">
               <a:solidFill>
                 <a:schemeClr val="tx1"/>
               </a:solidFill>
@@ -5220,7 +5114,7 @@
     </p:spTree>
     <p:extLst>
       <p:ext uri="{BB962C8B-B14F-4D97-AF65-F5344CB8AC3E}">
-        <p14:creationId xmlns:p14="http://schemas.microsoft.com/office/powerpoint/2010/main" val="967830448"/>
+        <p14:creationId xmlns:p14="http://schemas.microsoft.com/office/powerpoint/2010/main" val="3696768219"/>
       </p:ext>
     </p:extLst>
   </p:cSld>
@@ -5266,12 +5160,14 @@
         </p:nvSpPr>
         <p:spPr/>
         <p:txBody>
-          <a:bodyPr/>
-          <a:lstStyle/>
-          <a:p>
-            <a:r>
-              <a:rPr lang="en-US" dirty="0" smtClean="0"/>
-              <a:t>With context variable</a:t>
+          <a:bodyPr>
+            <a:normAutofit fontScale="90000"/>
+          </a:bodyPr>
+          <a:lstStyle/>
+          <a:p>
+            <a:r>
+              <a:rPr lang="en-US" dirty="0" smtClean="0"/>
+              <a:t>What happens as we descend into the structure?</a:t>
             </a:r>
             <a:endParaRPr lang="en-US" dirty="0"/>
           </a:p>
@@ -5290,306 +5186,44 @@
         <p:spPr/>
         <p:txBody>
           <a:bodyPr>
-            <a:normAutofit fontScale="70000" lnSpcReduction="20000"/>
+            <a:normAutofit/>
           </a:bodyPr>
           <a:lstStyle/>
           <a:p>
             <a:r>
-              <a:rPr lang="en-US" dirty="0"/>
-              <a:t>;; free-</a:t>
-            </a:r>
-            <a:r>
-              <a:rPr lang="en-US" dirty="0" err="1"/>
-              <a:t>vars</a:t>
-            </a:r>
-            <a:r>
-              <a:rPr lang="en-US" dirty="0"/>
-              <a:t>-in-</a:t>
-            </a:r>
-            <a:r>
-              <a:rPr lang="en-US" dirty="0" err="1"/>
-              <a:t>subexp</a:t>
-            </a:r>
-            <a:r>
-              <a:rPr lang="en-US" dirty="0"/>
-              <a:t> </a:t>
-            </a:r>
-            <a:endParaRPr lang="en-US" dirty="0" smtClean="0"/>
-          </a:p>
-          <a:p>
-            <a:r>
-              <a:rPr lang="en-US" dirty="0" smtClean="0"/>
-              <a:t>;;   : </a:t>
-            </a:r>
-            <a:r>
-              <a:rPr lang="en-US" dirty="0" err="1"/>
-              <a:t>FredExp</a:t>
-            </a:r>
-            <a:r>
-              <a:rPr lang="en-US" dirty="0"/>
-              <a:t> </a:t>
-            </a:r>
-            <a:r>
-              <a:rPr lang="en-US" dirty="0" err="1" smtClean="0"/>
-              <a:t>ListOfSymbol</a:t>
-            </a:r>
-            <a:r>
-              <a:rPr lang="en-US" dirty="0" smtClean="0"/>
-              <a:t> </a:t>
-            </a:r>
-            <a:r>
-              <a:rPr lang="en-US" dirty="0"/>
-              <a:t>-&gt; </a:t>
-            </a:r>
-            <a:r>
-              <a:rPr lang="en-US" dirty="0" err="1" smtClean="0"/>
-              <a:t>SetOfSymbol</a:t>
-            </a:r>
-            <a:endParaRPr lang="en-US" dirty="0"/>
-          </a:p>
-          <a:p>
-            <a:r>
-              <a:rPr lang="en-US" dirty="0"/>
-              <a:t>;; GIVEN: a </a:t>
-            </a:r>
-            <a:r>
-              <a:rPr lang="en-US" dirty="0" err="1"/>
-              <a:t>FredExp</a:t>
-            </a:r>
-            <a:r>
-              <a:rPr lang="en-US" dirty="0"/>
-              <a:t> </a:t>
-            </a:r>
-            <a:r>
-              <a:rPr lang="en-US" dirty="0">
-                <a:solidFill>
-                  <a:srgbClr val="FF0000"/>
-                </a:solidFill>
-              </a:rPr>
-              <a:t>f</a:t>
-            </a:r>
-            <a:r>
-              <a:rPr lang="en-US" dirty="0"/>
-              <a:t> that is part of </a:t>
-            </a:r>
-            <a:r>
-              <a:rPr lang="en-US" dirty="0" smtClean="0"/>
-              <a:t>some </a:t>
-            </a:r>
-            <a:r>
-              <a:rPr lang="en-US" dirty="0"/>
-              <a:t>larger </a:t>
-            </a:r>
-            <a:endParaRPr lang="en-US" dirty="0" smtClean="0"/>
-          </a:p>
-          <a:p>
-            <a:r>
-              <a:rPr lang="en-US" dirty="0" smtClean="0"/>
-              <a:t>;;   </a:t>
-            </a:r>
-            <a:r>
-              <a:rPr lang="en-US" dirty="0" err="1" smtClean="0"/>
-              <a:t>FredExp</a:t>
-            </a:r>
-            <a:r>
-              <a:rPr lang="en-US" dirty="0" smtClean="0"/>
-              <a:t> </a:t>
-            </a:r>
-            <a:r>
-              <a:rPr lang="en-US" dirty="0" smtClean="0">
-                <a:solidFill>
-                  <a:srgbClr val="FFC000"/>
-                </a:solidFill>
-              </a:rPr>
-              <a:t>f0</a:t>
-            </a:r>
-            <a:r>
-              <a:rPr lang="en-US" dirty="0" smtClean="0"/>
-              <a:t>, and a </a:t>
-            </a:r>
-            <a:r>
-              <a:rPr lang="en-US" dirty="0" err="1" smtClean="0"/>
-              <a:t>ListOfSymbol</a:t>
-            </a:r>
-            <a:r>
-              <a:rPr lang="en-US" dirty="0" smtClean="0"/>
-              <a:t> </a:t>
-            </a:r>
-            <a:r>
-              <a:rPr lang="en-US" dirty="0" err="1" smtClean="0">
-                <a:solidFill>
-                  <a:srgbClr val="FF0000"/>
-                </a:solidFill>
-              </a:rPr>
-              <a:t>bvars</a:t>
-            </a:r>
-            <a:endParaRPr lang="en-US" dirty="0">
-              <a:solidFill>
-                <a:srgbClr val="FF0000"/>
-              </a:solidFill>
-            </a:endParaRPr>
-          </a:p>
-          <a:p>
-            <a:r>
-              <a:rPr lang="en-US" dirty="0"/>
-              <a:t>;; WHERE: </a:t>
-            </a:r>
-            <a:r>
-              <a:rPr lang="en-US" dirty="0" err="1" smtClean="0"/>
-              <a:t>bvars</a:t>
-            </a:r>
-            <a:r>
-              <a:rPr lang="en-US" dirty="0" smtClean="0"/>
-              <a:t> </a:t>
-            </a:r>
-            <a:r>
-              <a:rPr lang="en-US" dirty="0"/>
-              <a:t>is the list of symbols that occur </a:t>
-            </a:r>
-            <a:r>
-              <a:rPr lang="en-US" dirty="0" smtClean="0"/>
-              <a:t>in</a:t>
-            </a:r>
-          </a:p>
-          <a:p>
-            <a:r>
-              <a:rPr lang="en-US" dirty="0" smtClean="0"/>
-              <a:t>;;   </a:t>
-            </a:r>
-            <a:r>
-              <a:rPr lang="en-US" dirty="0"/>
-              <a:t>lambdas above </a:t>
-            </a:r>
-            <a:r>
-              <a:rPr lang="en-US" dirty="0">
-                <a:solidFill>
-                  <a:srgbClr val="FF0000"/>
-                </a:solidFill>
-              </a:rPr>
-              <a:t>f</a:t>
-            </a:r>
-            <a:r>
-              <a:rPr lang="en-US" dirty="0"/>
-              <a:t> </a:t>
-            </a:r>
-            <a:r>
-              <a:rPr lang="en-US" dirty="0" smtClean="0"/>
-              <a:t>in </a:t>
-            </a:r>
-            <a:r>
-              <a:rPr lang="en-US" dirty="0">
-                <a:solidFill>
-                  <a:srgbClr val="FFC000"/>
-                </a:solidFill>
-              </a:rPr>
-              <a:t>f0</a:t>
-            </a:r>
-          </a:p>
-          <a:p>
-            <a:r>
-              <a:rPr lang="en-US" dirty="0"/>
-              <a:t>;; RETURNS: the set of symbols from </a:t>
-            </a:r>
-            <a:r>
-              <a:rPr lang="en-US" dirty="0">
-                <a:solidFill>
-                  <a:srgbClr val="FF0000"/>
-                </a:solidFill>
-              </a:rPr>
-              <a:t>f</a:t>
-            </a:r>
-            <a:r>
-              <a:rPr lang="en-US" dirty="0"/>
-              <a:t> that are </a:t>
-            </a:r>
-            <a:r>
-              <a:rPr lang="en-US" dirty="0" smtClean="0"/>
-              <a:t>free</a:t>
-            </a:r>
-          </a:p>
-          <a:p>
-            <a:r>
-              <a:rPr lang="en-US" dirty="0" smtClean="0"/>
-              <a:t>;;   </a:t>
-            </a:r>
-            <a:r>
-              <a:rPr lang="en-US" dirty="0"/>
-              <a:t>in </a:t>
-            </a:r>
-            <a:r>
-              <a:rPr lang="en-US" dirty="0">
-                <a:solidFill>
-                  <a:srgbClr val="FFC000"/>
-                </a:solidFill>
-              </a:rPr>
-              <a:t>f0</a:t>
-            </a:r>
-            <a:r>
-              <a:rPr lang="en-US" dirty="0"/>
-              <a:t>.</a:t>
-            </a:r>
-          </a:p>
-          <a:p>
-            <a:endParaRPr lang="en-US" dirty="0"/>
-          </a:p>
-          <a:p>
-            <a:r>
-              <a:rPr lang="en-US" dirty="0"/>
-              <a:t>;; EXAMPLE: </a:t>
-            </a:r>
-          </a:p>
-          <a:p>
-            <a:r>
-              <a:rPr lang="en-US" dirty="0"/>
-              <a:t>;; (free-</a:t>
-            </a:r>
-            <a:r>
-              <a:rPr lang="en-US" dirty="0" err="1"/>
-              <a:t>vars</a:t>
-            </a:r>
-            <a:r>
-              <a:rPr lang="en-US" dirty="0"/>
-              <a:t>-in-</a:t>
-            </a:r>
-            <a:r>
-              <a:rPr lang="en-US" dirty="0" err="1"/>
-              <a:t>subexp</a:t>
-            </a:r>
-            <a:r>
-              <a:rPr lang="en-US" dirty="0"/>
-              <a:t> </a:t>
-            </a:r>
-            <a:endParaRPr lang="en-US" dirty="0" smtClean="0"/>
-          </a:p>
-          <a:p>
-            <a:r>
-              <a:rPr lang="en-US" dirty="0" smtClean="0"/>
-              <a:t>;;   (</a:t>
-            </a:r>
-            <a:r>
-              <a:rPr lang="en-US" dirty="0"/>
-              <a:t>z (lambda (x) (x y))) (list z)) </a:t>
-            </a:r>
-            <a:endParaRPr lang="en-US" dirty="0" smtClean="0"/>
-          </a:p>
-          <a:p>
-            <a:r>
-              <a:rPr lang="en-US" dirty="0" smtClean="0"/>
-              <a:t>;; = </a:t>
-            </a:r>
-            <a:r>
-              <a:rPr lang="en-US" dirty="0"/>
-              <a:t>(list y) </a:t>
-            </a:r>
-          </a:p>
-          <a:p>
-            <a:endParaRPr lang="en-US" dirty="0"/>
-          </a:p>
-        </p:txBody>
-      </p:sp>
-      <p:sp>
-        <p:nvSpPr>
-          <p:cNvPr id="5" name="Slide Number Placeholder 4"/>
+              <a:rPr lang="en-US" dirty="0" smtClean="0"/>
+              <a:t>We lose information about which lambda-variables are above us.</a:t>
+            </a:r>
+          </a:p>
+          <a:p>
+            <a:r>
+              <a:rPr lang="en-US" dirty="0" smtClean="0"/>
+              <a:t>So we'll add a context variable to keep track of the lambda-variables above us</a:t>
+            </a:r>
+          </a:p>
+          <a:p>
+            <a:pPr lvl="1"/>
+            <a:r>
+              <a:rPr lang="en-US" dirty="0" smtClean="0"/>
+              <a:t>when we hit a variable, see if it's already in this list.  If so, it's not free in the whole expression. </a:t>
+            </a:r>
+          </a:p>
+          <a:p>
+            <a:pPr lvl="1"/>
+            <a:r>
+              <a:rPr lang="en-US" dirty="0" smtClean="0"/>
+              <a:t>This is like the counter in </a:t>
+            </a:r>
+            <a:r>
+              <a:rPr lang="en-US" b="1" dirty="0" smtClean="0"/>
+              <a:t>mark-depth</a:t>
+            </a:r>
+          </a:p>
+        </p:txBody>
+      </p:sp>
+      <p:sp>
+        <p:nvSpPr>
+          <p:cNvPr id="4" name="Slide Number Placeholder 3"/>
           <p:cNvSpPr>
             <a:spLocks noGrp="1"/>
           </p:cNvSpPr>
@@ -5613,7 +5247,7 @@
               <a:pPr/>
               <a:t>12</a:t>
             </a:fld>
-            <a:endParaRPr lang="en-US">
+            <a:endParaRPr lang="en-US" dirty="0">
               <a:solidFill>
                 <a:prstClr val="black">
                   <a:tint val="75000"/>
@@ -5623,135 +5257,10 @@
           </a:p>
         </p:txBody>
       </p:sp>
-      <p:sp>
-        <p:nvSpPr>
-          <p:cNvPr id="4" name="Rectangle 3"/>
-          <p:cNvSpPr/>
-          <p:nvPr/>
-        </p:nvSpPr>
-        <p:spPr>
-          <a:xfrm>
-            <a:off x="5029200" y="3962400"/>
-            <a:ext cx="3657600" cy="1219200"/>
-          </a:xfrm>
-          <a:prstGeom prst="rect">
-            <a:avLst/>
-          </a:prstGeom>
-          <a:solidFill>
-            <a:schemeClr val="accent3">
-              <a:lumMod val="40000"/>
-              <a:lumOff val="60000"/>
-            </a:schemeClr>
-          </a:solidFill>
-          <a:ln/>
-        </p:spPr>
-        <p:style>
-          <a:lnRef idx="2">
-            <a:schemeClr val="accent1"/>
-          </a:lnRef>
-          <a:fillRef idx="1">
-            <a:schemeClr val="lt1"/>
-          </a:fillRef>
-          <a:effectRef idx="0">
-            <a:schemeClr val="accent1"/>
-          </a:effectRef>
-          <a:fontRef idx="minor">
-            <a:schemeClr val="dk1"/>
-          </a:fontRef>
-        </p:style>
-        <p:txBody>
-          <a:bodyPr rot="0" spcFirstLastPara="0" vertOverflow="overflow" horzOverflow="overflow" vert="horz" wrap="square" lIns="91440" tIns="45720" rIns="91440" bIns="45720" numCol="1" spcCol="0" rtlCol="0" fromWordArt="0" anchor="ctr" anchorCtr="0" forceAA="0" compatLnSpc="1">
-            <a:prstTxWarp prst="textNoShape">
-              <a:avLst/>
-            </a:prstTxWarp>
-            <a:noAutofit/>
-          </a:bodyPr>
-          <a:lstStyle/>
-          <a:p>
-            <a:r>
-              <a:rPr lang="en-US" dirty="0" smtClean="0">
-                <a:solidFill>
-                  <a:schemeClr val="tx1"/>
-                </a:solidFill>
-              </a:rPr>
-              <a:t>We don’t know what </a:t>
-            </a:r>
-            <a:r>
-              <a:rPr lang="en-US" b="1" dirty="0" smtClean="0">
-                <a:solidFill>
-                  <a:schemeClr val="tx1"/>
-                </a:solidFill>
-              </a:rPr>
-              <a:t>f0</a:t>
-            </a:r>
-            <a:r>
-              <a:rPr lang="en-US" dirty="0" smtClean="0">
-                <a:solidFill>
-                  <a:schemeClr val="tx1"/>
-                </a:solidFill>
-              </a:rPr>
-              <a:t> is.  We only know that </a:t>
-            </a:r>
-            <a:r>
-              <a:rPr lang="en-US" b="1" dirty="0" err="1" smtClean="0">
-                <a:solidFill>
-                  <a:schemeClr val="tx1"/>
-                </a:solidFill>
-              </a:rPr>
-              <a:t>bvars</a:t>
-            </a:r>
-            <a:r>
-              <a:rPr lang="en-US" dirty="0" smtClean="0">
-                <a:solidFill>
-                  <a:schemeClr val="tx1"/>
-                </a:solidFill>
-              </a:rPr>
-              <a:t> is the list of symbols that occur above </a:t>
-            </a:r>
-            <a:r>
-              <a:rPr lang="en-US" b="1" dirty="0" smtClean="0">
-                <a:solidFill>
-                  <a:schemeClr val="tx1"/>
-                </a:solidFill>
-              </a:rPr>
-              <a:t>f</a:t>
-            </a:r>
-            <a:r>
-              <a:rPr lang="en-US" dirty="0" smtClean="0">
-                <a:solidFill>
-                  <a:schemeClr val="tx1"/>
-                </a:solidFill>
-              </a:rPr>
-              <a:t> in </a:t>
-            </a:r>
-            <a:r>
-              <a:rPr lang="en-US" b="1" dirty="0" smtClean="0">
-                <a:solidFill>
-                  <a:schemeClr val="tx1"/>
-                </a:solidFill>
-              </a:rPr>
-              <a:t>f0</a:t>
-            </a:r>
-            <a:r>
-              <a:rPr lang="en-US" dirty="0" smtClean="0">
-                <a:solidFill>
-                  <a:schemeClr val="tx1"/>
-                </a:solidFill>
-              </a:rPr>
-              <a:t>. (See Lesson 7.1, Slide 27)</a:t>
-            </a:r>
-            <a:endParaRPr lang="en-US" dirty="0">
-              <a:solidFill>
-                <a:schemeClr val="tx1"/>
-              </a:solidFill>
-            </a:endParaRPr>
-          </a:p>
-        </p:txBody>
-      </p:sp>
     </p:spTree>
     <p:extLst>
       <p:ext uri="{BB962C8B-B14F-4D97-AF65-F5344CB8AC3E}">
-        <p14:creationId xmlns:p14="http://schemas.microsoft.com/office/powerpoint/2010/main" val="2506840274"/>
+        <p14:creationId xmlns:p14="http://schemas.microsoft.com/office/powerpoint/2010/main" val="3518516738"/>
       </p:ext>
     </p:extLst>
   </p:cSld>
@@ -5802,6 +5311,1021 @@
           <a:p>
             <a:r>
               <a:rPr lang="en-US" dirty="0" smtClean="0"/>
+              <a:t>With context variable</a:t>
+            </a:r>
+            <a:endParaRPr lang="en-US" dirty="0"/>
+          </a:p>
+        </p:txBody>
+      </p:sp>
+      <p:sp>
+        <p:nvSpPr>
+          <p:cNvPr id="3" name="Content Placeholder 2"/>
+          <p:cNvSpPr>
+            <a:spLocks noGrp="1"/>
+          </p:cNvSpPr>
+          <p:nvPr>
+            <p:ph idx="1"/>
+          </p:nvPr>
+        </p:nvSpPr>
+        <p:spPr/>
+        <p:txBody>
+          <a:bodyPr>
+            <a:normAutofit fontScale="70000" lnSpcReduction="20000"/>
+          </a:bodyPr>
+          <a:lstStyle/>
+          <a:p>
+            <a:r>
+              <a:rPr lang="en-US" dirty="0"/>
+              <a:t>;; free-</a:t>
+            </a:r>
+            <a:r>
+              <a:rPr lang="en-US" dirty="0" err="1"/>
+              <a:t>vars</a:t>
+            </a:r>
+            <a:r>
+              <a:rPr lang="en-US" dirty="0"/>
+              <a:t>-in-</a:t>
+            </a:r>
+            <a:r>
+              <a:rPr lang="en-US" dirty="0" err="1"/>
+              <a:t>subexp</a:t>
+            </a:r>
+            <a:r>
+              <a:rPr lang="en-US" dirty="0"/>
+              <a:t> </a:t>
+            </a:r>
+            <a:endParaRPr lang="en-US" dirty="0" smtClean="0"/>
+          </a:p>
+          <a:p>
+            <a:r>
+              <a:rPr lang="en-US" dirty="0" smtClean="0"/>
+              <a:t>;;   : </a:t>
+            </a:r>
+            <a:r>
+              <a:rPr lang="en-US" dirty="0" err="1"/>
+              <a:t>FredExp</a:t>
+            </a:r>
+            <a:r>
+              <a:rPr lang="en-US" dirty="0"/>
+              <a:t> </a:t>
+            </a:r>
+            <a:r>
+              <a:rPr lang="en-US" dirty="0" err="1" smtClean="0"/>
+              <a:t>ListOfSymbol</a:t>
+            </a:r>
+            <a:r>
+              <a:rPr lang="en-US" dirty="0" smtClean="0"/>
+              <a:t> </a:t>
+            </a:r>
+            <a:r>
+              <a:rPr lang="en-US" dirty="0"/>
+              <a:t>-&gt; </a:t>
+            </a:r>
+            <a:r>
+              <a:rPr lang="en-US" dirty="0" err="1" smtClean="0"/>
+              <a:t>SetOfSymbol</a:t>
+            </a:r>
+            <a:endParaRPr lang="en-US" dirty="0"/>
+          </a:p>
+          <a:p>
+            <a:r>
+              <a:rPr lang="en-US" dirty="0"/>
+              <a:t>;; GIVEN: a </a:t>
+            </a:r>
+            <a:r>
+              <a:rPr lang="en-US" dirty="0" err="1"/>
+              <a:t>FredExp</a:t>
+            </a:r>
+            <a:r>
+              <a:rPr lang="en-US" dirty="0"/>
+              <a:t> </a:t>
+            </a:r>
+            <a:r>
+              <a:rPr lang="en-US" dirty="0">
+                <a:solidFill>
+                  <a:srgbClr val="FF0000"/>
+                </a:solidFill>
+              </a:rPr>
+              <a:t>f</a:t>
+            </a:r>
+            <a:r>
+              <a:rPr lang="en-US" dirty="0"/>
+              <a:t> that is part of </a:t>
+            </a:r>
+            <a:r>
+              <a:rPr lang="en-US" dirty="0" smtClean="0"/>
+              <a:t>some </a:t>
+            </a:r>
+            <a:r>
+              <a:rPr lang="en-US" dirty="0"/>
+              <a:t>larger </a:t>
+            </a:r>
+            <a:endParaRPr lang="en-US" dirty="0" smtClean="0"/>
+          </a:p>
+          <a:p>
+            <a:r>
+              <a:rPr lang="en-US" dirty="0" smtClean="0"/>
+              <a:t>;;   </a:t>
+            </a:r>
+            <a:r>
+              <a:rPr lang="en-US" dirty="0" err="1" smtClean="0"/>
+              <a:t>FredExp</a:t>
+            </a:r>
+            <a:r>
+              <a:rPr lang="en-US" dirty="0" smtClean="0"/>
+              <a:t> </a:t>
+            </a:r>
+            <a:r>
+              <a:rPr lang="en-US" dirty="0" smtClean="0">
+                <a:solidFill>
+                  <a:srgbClr val="FFC000"/>
+                </a:solidFill>
+              </a:rPr>
+              <a:t>f0</a:t>
+            </a:r>
+            <a:r>
+              <a:rPr lang="en-US" dirty="0" smtClean="0"/>
+              <a:t>, and a </a:t>
+            </a:r>
+            <a:r>
+              <a:rPr lang="en-US" dirty="0" err="1" smtClean="0"/>
+              <a:t>ListOfSymbol</a:t>
+            </a:r>
+            <a:r>
+              <a:rPr lang="en-US" dirty="0" smtClean="0"/>
+              <a:t> </a:t>
+            </a:r>
+            <a:r>
+              <a:rPr lang="en-US" dirty="0" err="1" smtClean="0">
+                <a:solidFill>
+                  <a:srgbClr val="FF0000"/>
+                </a:solidFill>
+              </a:rPr>
+              <a:t>bvars</a:t>
+            </a:r>
+            <a:endParaRPr lang="en-US" dirty="0">
+              <a:solidFill>
+                <a:srgbClr val="FF0000"/>
+              </a:solidFill>
+            </a:endParaRPr>
+          </a:p>
+          <a:p>
+            <a:r>
+              <a:rPr lang="en-US" dirty="0"/>
+              <a:t>;; WHERE: </a:t>
+            </a:r>
+            <a:r>
+              <a:rPr lang="en-US" dirty="0" err="1" smtClean="0"/>
+              <a:t>bvars</a:t>
+            </a:r>
+            <a:r>
+              <a:rPr lang="en-US" dirty="0" smtClean="0"/>
+              <a:t> </a:t>
+            </a:r>
+            <a:r>
+              <a:rPr lang="en-US" dirty="0"/>
+              <a:t>is the list of symbols that occur </a:t>
+            </a:r>
+            <a:r>
+              <a:rPr lang="en-US" dirty="0" smtClean="0"/>
+              <a:t>in</a:t>
+            </a:r>
+          </a:p>
+          <a:p>
+            <a:r>
+              <a:rPr lang="en-US" dirty="0" smtClean="0"/>
+              <a:t>;;   </a:t>
+            </a:r>
+            <a:r>
+              <a:rPr lang="en-US" dirty="0"/>
+              <a:t>lambdas above </a:t>
+            </a:r>
+            <a:r>
+              <a:rPr lang="en-US" dirty="0">
+                <a:solidFill>
+                  <a:srgbClr val="FF0000"/>
+                </a:solidFill>
+              </a:rPr>
+              <a:t>f</a:t>
+            </a:r>
+            <a:r>
+              <a:rPr lang="en-US" dirty="0"/>
+              <a:t> </a:t>
+            </a:r>
+            <a:r>
+              <a:rPr lang="en-US" dirty="0" smtClean="0"/>
+              <a:t>in </a:t>
+            </a:r>
+            <a:r>
+              <a:rPr lang="en-US" dirty="0">
+                <a:solidFill>
+                  <a:srgbClr val="FFC000"/>
+                </a:solidFill>
+              </a:rPr>
+              <a:t>f0</a:t>
+            </a:r>
+          </a:p>
+          <a:p>
+            <a:r>
+              <a:rPr lang="en-US" dirty="0"/>
+              <a:t>;; RETURNS: the set of symbols from </a:t>
+            </a:r>
+            <a:r>
+              <a:rPr lang="en-US" dirty="0">
+                <a:solidFill>
+                  <a:srgbClr val="FF0000"/>
+                </a:solidFill>
+              </a:rPr>
+              <a:t>f</a:t>
+            </a:r>
+            <a:r>
+              <a:rPr lang="en-US" dirty="0"/>
+              <a:t> that are </a:t>
+            </a:r>
+            <a:r>
+              <a:rPr lang="en-US" dirty="0" smtClean="0"/>
+              <a:t>free</a:t>
+            </a:r>
+          </a:p>
+          <a:p>
+            <a:r>
+              <a:rPr lang="en-US" dirty="0" smtClean="0"/>
+              <a:t>;;   </a:t>
+            </a:r>
+            <a:r>
+              <a:rPr lang="en-US" dirty="0"/>
+              <a:t>in </a:t>
+            </a:r>
+            <a:r>
+              <a:rPr lang="en-US" dirty="0">
+                <a:solidFill>
+                  <a:srgbClr val="FFC000"/>
+                </a:solidFill>
+              </a:rPr>
+              <a:t>f0</a:t>
+            </a:r>
+            <a:r>
+              <a:rPr lang="en-US" dirty="0"/>
+              <a:t>.</a:t>
+            </a:r>
+          </a:p>
+          <a:p>
+            <a:endParaRPr lang="en-US" dirty="0"/>
+          </a:p>
+          <a:p>
+            <a:r>
+              <a:rPr lang="en-US" dirty="0"/>
+              <a:t>;; EXAMPLE: </a:t>
+            </a:r>
+          </a:p>
+          <a:p>
+            <a:r>
+              <a:rPr lang="en-US" dirty="0"/>
+              <a:t>;; (free-</a:t>
+            </a:r>
+            <a:r>
+              <a:rPr lang="en-US" dirty="0" err="1"/>
+              <a:t>vars</a:t>
+            </a:r>
+            <a:r>
+              <a:rPr lang="en-US" dirty="0"/>
+              <a:t>-in-</a:t>
+            </a:r>
+            <a:r>
+              <a:rPr lang="en-US" dirty="0" err="1"/>
+              <a:t>subexp</a:t>
+            </a:r>
+            <a:r>
+              <a:rPr lang="en-US" dirty="0"/>
+              <a:t> </a:t>
+            </a:r>
+            <a:endParaRPr lang="en-US" dirty="0" smtClean="0"/>
+          </a:p>
+          <a:p>
+            <a:r>
+              <a:rPr lang="en-US" dirty="0" smtClean="0"/>
+              <a:t>;;   (</a:t>
+            </a:r>
+            <a:r>
+              <a:rPr lang="en-US" dirty="0"/>
+              <a:t>z (lambda (x) (x y))) (list z)) </a:t>
+            </a:r>
+            <a:endParaRPr lang="en-US" dirty="0" smtClean="0"/>
+          </a:p>
+          <a:p>
+            <a:r>
+              <a:rPr lang="en-US" dirty="0" smtClean="0"/>
+              <a:t>;; = </a:t>
+            </a:r>
+            <a:r>
+              <a:rPr lang="en-US" dirty="0"/>
+              <a:t>(list y) </a:t>
+            </a:r>
+          </a:p>
+          <a:p>
+            <a:endParaRPr lang="en-US" dirty="0"/>
+          </a:p>
+        </p:txBody>
+      </p:sp>
+      <p:sp>
+        <p:nvSpPr>
+          <p:cNvPr id="5" name="Slide Number Placeholder 4"/>
+          <p:cNvSpPr>
+            <a:spLocks noGrp="1"/>
+          </p:cNvSpPr>
+          <p:nvPr>
+            <p:ph type="sldNum" sz="quarter" idx="12"/>
+          </p:nvPr>
+        </p:nvSpPr>
+        <p:spPr/>
+        <p:txBody>
+          <a:bodyPr/>
+          <a:lstStyle/>
+          <a:p>
+            <a:fld id="{9F4492BD-6A9C-48FC-AC76-0B4FE11194A1}" type="slidenum">
+              <a:rPr lang="en-US" smtClean="0">
+                <a:solidFill>
+                  <a:prstClr val="black">
+                    <a:tint val="75000"/>
+                  </a:prstClr>
+                </a:solidFill>
+              </a:rPr>
+              <a:pPr/>
+              <a:t>13</a:t>
+            </a:fld>
+            <a:endParaRPr lang="en-US">
+              <a:solidFill>
+                <a:prstClr val="black">
+                  <a:tint val="75000"/>
+                </a:prstClr>
+              </a:solidFill>
+            </a:endParaRPr>
+          </a:p>
+        </p:txBody>
+      </p:sp>
+      <p:sp>
+        <p:nvSpPr>
+          <p:cNvPr id="4" name="Rectangle 3"/>
+          <p:cNvSpPr/>
+          <p:nvPr/>
+        </p:nvSpPr>
+        <p:spPr>
+          <a:xfrm>
+            <a:off x="4995797" y="4038600"/>
+            <a:ext cx="3657600" cy="990600"/>
+          </a:xfrm>
+          <a:prstGeom prst="rect">
+            <a:avLst/>
+          </a:prstGeom>
+          <a:solidFill>
+            <a:schemeClr val="accent3">
+              <a:lumMod val="40000"/>
+              <a:lumOff val="60000"/>
+            </a:schemeClr>
+          </a:solidFill>
+          <a:ln/>
+        </p:spPr>
+        <p:style>
+          <a:lnRef idx="2">
+            <a:schemeClr val="accent1"/>
+          </a:lnRef>
+          <a:fillRef idx="1">
+            <a:schemeClr val="lt1"/>
+          </a:fillRef>
+          <a:effectRef idx="0">
+            <a:schemeClr val="accent1"/>
+          </a:effectRef>
+          <a:fontRef idx="minor">
+            <a:schemeClr val="dk1"/>
+          </a:fontRef>
+        </p:style>
+        <p:txBody>
+          <a:bodyPr rot="0" spcFirstLastPara="0" vertOverflow="overflow" horzOverflow="overflow" vert="horz" wrap="square" lIns="91440" tIns="45720" rIns="91440" bIns="45720" numCol="1" spcCol="0" rtlCol="0" fromWordArt="0" anchor="ctr" anchorCtr="0" forceAA="0" compatLnSpc="1">
+            <a:prstTxWarp prst="textNoShape">
+              <a:avLst/>
+            </a:prstTxWarp>
+            <a:noAutofit/>
+          </a:bodyPr>
+          <a:lstStyle/>
+          <a:p>
+            <a:pPr algn="ctr"/>
+            <a:r>
+              <a:rPr lang="en-US" dirty="0" smtClean="0">
+                <a:solidFill>
+                  <a:schemeClr val="tx1"/>
+                </a:solidFill>
+              </a:rPr>
+              <a:t>The invariant (</a:t>
+            </a:r>
+            <a:r>
+              <a:rPr lang="en-US" b="1" dirty="0" smtClean="0">
+                <a:solidFill>
+                  <a:schemeClr val="tx1"/>
+                </a:solidFill>
+              </a:rPr>
+              <a:t>WHERE</a:t>
+            </a:r>
+            <a:r>
+              <a:rPr lang="en-US" dirty="0" smtClean="0">
+                <a:solidFill>
+                  <a:schemeClr val="tx1"/>
+                </a:solidFill>
+              </a:rPr>
+              <a:t> clause) gives an interpretation for the context variable</a:t>
+            </a:r>
+            <a:endParaRPr lang="en-US" dirty="0">
+              <a:solidFill>
+                <a:schemeClr val="tx1"/>
+              </a:solidFill>
+            </a:endParaRPr>
+          </a:p>
+        </p:txBody>
+      </p:sp>
+    </p:spTree>
+    <p:extLst>
+      <p:ext uri="{BB962C8B-B14F-4D97-AF65-F5344CB8AC3E}">
+        <p14:creationId xmlns:p14="http://schemas.microsoft.com/office/powerpoint/2010/main" val="967830448"/>
+      </p:ext>
+    </p:extLst>
+  </p:cSld>
+  <p:clrMapOvr>
+    <a:masterClrMapping/>
+  </p:clrMapOvr>
+  <p:timing>
+    <p:tnLst>
+      <p:par>
+        <p:cTn id="1" dur="indefinite" restart="never" nodeType="tmRoot"/>
+      </p:par>
+    </p:tnLst>
+  </p:timing>
+</p:sld>
+</file>
+
+<file path=ppt/slides/slide14.xml><?xml version="1.0" encoding="utf-8"?>
+<p:sld xmlns:a="http://schemas.openxmlformats.org/drawingml/2006/main" xmlns:r="http://schemas.openxmlformats.org/officeDocument/2006/relationships" xmlns:p="http://schemas.openxmlformats.org/presentationml/2006/main">
+  <p:cSld>
+    <p:spTree>
+      <p:nvGrpSpPr>
+        <p:cNvPr id="1" name=""/>
+        <p:cNvGrpSpPr/>
+        <p:nvPr/>
+      </p:nvGrpSpPr>
+      <p:grpSpPr>
+        <a:xfrm>
+          <a:off x="0" y="0"/>
+          <a:ext cx="0" cy="0"/>
+          <a:chOff x="0" y="0"/>
+          <a:chExt cx="0" cy="0"/>
+        </a:xfrm>
+      </p:grpSpPr>
+      <p:sp>
+        <p:nvSpPr>
+          <p:cNvPr id="2" name="Title 1"/>
+          <p:cNvSpPr>
+            <a:spLocks noGrp="1"/>
+          </p:cNvSpPr>
+          <p:nvPr>
+            <p:ph type="title"/>
+          </p:nvPr>
+        </p:nvSpPr>
+        <p:spPr/>
+        <p:txBody>
+          <a:bodyPr/>
+          <a:lstStyle/>
+          <a:p>
+            <a:r>
+              <a:rPr lang="en-US" dirty="0" smtClean="0"/>
+              <a:t>With context variable</a:t>
+            </a:r>
+            <a:endParaRPr lang="en-US" dirty="0"/>
+          </a:p>
+        </p:txBody>
+      </p:sp>
+      <p:sp>
+        <p:nvSpPr>
+          <p:cNvPr id="3" name="Content Placeholder 2"/>
+          <p:cNvSpPr>
+            <a:spLocks noGrp="1"/>
+          </p:cNvSpPr>
+          <p:nvPr>
+            <p:ph idx="1"/>
+          </p:nvPr>
+        </p:nvSpPr>
+        <p:spPr/>
+        <p:txBody>
+          <a:bodyPr>
+            <a:normAutofit fontScale="70000" lnSpcReduction="20000"/>
+          </a:bodyPr>
+          <a:lstStyle/>
+          <a:p>
+            <a:r>
+              <a:rPr lang="en-US" dirty="0"/>
+              <a:t>;; free-</a:t>
+            </a:r>
+            <a:r>
+              <a:rPr lang="en-US" dirty="0" err="1"/>
+              <a:t>vars</a:t>
+            </a:r>
+            <a:r>
+              <a:rPr lang="en-US" dirty="0"/>
+              <a:t>-in-</a:t>
+            </a:r>
+            <a:r>
+              <a:rPr lang="en-US" dirty="0" err="1"/>
+              <a:t>subexp</a:t>
+            </a:r>
+            <a:r>
+              <a:rPr lang="en-US" dirty="0"/>
+              <a:t> </a:t>
+            </a:r>
+            <a:endParaRPr lang="en-US" dirty="0" smtClean="0"/>
+          </a:p>
+          <a:p>
+            <a:r>
+              <a:rPr lang="en-US" dirty="0" smtClean="0"/>
+              <a:t>;;   : </a:t>
+            </a:r>
+            <a:r>
+              <a:rPr lang="en-US" dirty="0" err="1"/>
+              <a:t>FredExp</a:t>
+            </a:r>
+            <a:r>
+              <a:rPr lang="en-US" dirty="0"/>
+              <a:t> </a:t>
+            </a:r>
+            <a:r>
+              <a:rPr lang="en-US" dirty="0" err="1" smtClean="0"/>
+              <a:t>ListOfSymbol</a:t>
+            </a:r>
+            <a:r>
+              <a:rPr lang="en-US" dirty="0" smtClean="0"/>
+              <a:t> </a:t>
+            </a:r>
+            <a:r>
+              <a:rPr lang="en-US" dirty="0"/>
+              <a:t>-&gt; </a:t>
+            </a:r>
+            <a:r>
+              <a:rPr lang="en-US" dirty="0" err="1" smtClean="0"/>
+              <a:t>SetOfSymbol</a:t>
+            </a:r>
+            <a:endParaRPr lang="en-US" dirty="0"/>
+          </a:p>
+          <a:p>
+            <a:r>
+              <a:rPr lang="en-US" dirty="0"/>
+              <a:t>;; GIVEN: a </a:t>
+            </a:r>
+            <a:r>
+              <a:rPr lang="en-US" dirty="0" err="1"/>
+              <a:t>FredExp</a:t>
+            </a:r>
+            <a:r>
+              <a:rPr lang="en-US" dirty="0"/>
+              <a:t> </a:t>
+            </a:r>
+            <a:r>
+              <a:rPr lang="en-US" dirty="0">
+                <a:solidFill>
+                  <a:srgbClr val="FF0000"/>
+                </a:solidFill>
+              </a:rPr>
+              <a:t>f</a:t>
+            </a:r>
+            <a:r>
+              <a:rPr lang="en-US" dirty="0"/>
+              <a:t> that is part of </a:t>
+            </a:r>
+            <a:r>
+              <a:rPr lang="en-US" dirty="0" smtClean="0"/>
+              <a:t>some </a:t>
+            </a:r>
+            <a:r>
+              <a:rPr lang="en-US" dirty="0"/>
+              <a:t>larger </a:t>
+            </a:r>
+            <a:endParaRPr lang="en-US" dirty="0" smtClean="0"/>
+          </a:p>
+          <a:p>
+            <a:r>
+              <a:rPr lang="en-US" dirty="0" smtClean="0"/>
+              <a:t>;;   </a:t>
+            </a:r>
+            <a:r>
+              <a:rPr lang="en-US" dirty="0" err="1" smtClean="0"/>
+              <a:t>FredExp</a:t>
+            </a:r>
+            <a:r>
+              <a:rPr lang="en-US" dirty="0" smtClean="0"/>
+              <a:t> </a:t>
+            </a:r>
+            <a:r>
+              <a:rPr lang="en-US" dirty="0" smtClean="0">
+                <a:solidFill>
+                  <a:srgbClr val="FFC000"/>
+                </a:solidFill>
+              </a:rPr>
+              <a:t>f0</a:t>
+            </a:r>
+            <a:r>
+              <a:rPr lang="en-US" dirty="0" smtClean="0"/>
+              <a:t>, and a </a:t>
+            </a:r>
+            <a:r>
+              <a:rPr lang="en-US" dirty="0" err="1" smtClean="0"/>
+              <a:t>ListOfSymbol</a:t>
+            </a:r>
+            <a:r>
+              <a:rPr lang="en-US" dirty="0" smtClean="0"/>
+              <a:t> </a:t>
+            </a:r>
+            <a:r>
+              <a:rPr lang="en-US" dirty="0" err="1" smtClean="0">
+                <a:solidFill>
+                  <a:srgbClr val="FF0000"/>
+                </a:solidFill>
+              </a:rPr>
+              <a:t>bvars</a:t>
+            </a:r>
+            <a:endParaRPr lang="en-US" dirty="0">
+              <a:solidFill>
+                <a:srgbClr val="FF0000"/>
+              </a:solidFill>
+            </a:endParaRPr>
+          </a:p>
+          <a:p>
+            <a:r>
+              <a:rPr lang="en-US" dirty="0"/>
+              <a:t>;; WHERE: </a:t>
+            </a:r>
+            <a:r>
+              <a:rPr lang="en-US" dirty="0" err="1" smtClean="0"/>
+              <a:t>bvars</a:t>
+            </a:r>
+            <a:r>
+              <a:rPr lang="en-US" dirty="0" smtClean="0"/>
+              <a:t> </a:t>
+            </a:r>
+            <a:r>
+              <a:rPr lang="en-US" dirty="0"/>
+              <a:t>is the list of symbols that occur </a:t>
+            </a:r>
+            <a:r>
+              <a:rPr lang="en-US" dirty="0" smtClean="0"/>
+              <a:t>in</a:t>
+            </a:r>
+          </a:p>
+          <a:p>
+            <a:r>
+              <a:rPr lang="en-US" dirty="0" smtClean="0"/>
+              <a:t>;;   </a:t>
+            </a:r>
+            <a:r>
+              <a:rPr lang="en-US" dirty="0"/>
+              <a:t>lambdas above </a:t>
+            </a:r>
+            <a:r>
+              <a:rPr lang="en-US" dirty="0">
+                <a:solidFill>
+                  <a:srgbClr val="FF0000"/>
+                </a:solidFill>
+              </a:rPr>
+              <a:t>f</a:t>
+            </a:r>
+            <a:r>
+              <a:rPr lang="en-US" dirty="0"/>
+              <a:t> </a:t>
+            </a:r>
+            <a:r>
+              <a:rPr lang="en-US" dirty="0" smtClean="0"/>
+              <a:t>in </a:t>
+            </a:r>
+            <a:r>
+              <a:rPr lang="en-US" dirty="0">
+                <a:solidFill>
+                  <a:srgbClr val="FFC000"/>
+                </a:solidFill>
+              </a:rPr>
+              <a:t>f0</a:t>
+            </a:r>
+          </a:p>
+          <a:p>
+            <a:r>
+              <a:rPr lang="en-US" dirty="0"/>
+              <a:t>;; RETURNS: the set of symbols from </a:t>
+            </a:r>
+            <a:r>
+              <a:rPr lang="en-US" dirty="0">
+                <a:solidFill>
+                  <a:srgbClr val="FF0000"/>
+                </a:solidFill>
+              </a:rPr>
+              <a:t>f</a:t>
+            </a:r>
+            <a:r>
+              <a:rPr lang="en-US" dirty="0"/>
+              <a:t> that are </a:t>
+            </a:r>
+            <a:r>
+              <a:rPr lang="en-US" dirty="0" smtClean="0"/>
+              <a:t>free</a:t>
+            </a:r>
+          </a:p>
+          <a:p>
+            <a:r>
+              <a:rPr lang="en-US" dirty="0" smtClean="0"/>
+              <a:t>;;   </a:t>
+            </a:r>
+            <a:r>
+              <a:rPr lang="en-US" dirty="0"/>
+              <a:t>in </a:t>
+            </a:r>
+            <a:r>
+              <a:rPr lang="en-US" dirty="0">
+                <a:solidFill>
+                  <a:srgbClr val="FFC000"/>
+                </a:solidFill>
+              </a:rPr>
+              <a:t>f0</a:t>
+            </a:r>
+            <a:r>
+              <a:rPr lang="en-US" dirty="0"/>
+              <a:t>.</a:t>
+            </a:r>
+          </a:p>
+          <a:p>
+            <a:endParaRPr lang="en-US" dirty="0"/>
+          </a:p>
+          <a:p>
+            <a:r>
+              <a:rPr lang="en-US" dirty="0"/>
+              <a:t>;; EXAMPLE: </a:t>
+            </a:r>
+          </a:p>
+          <a:p>
+            <a:r>
+              <a:rPr lang="en-US" dirty="0"/>
+              <a:t>;; (free-</a:t>
+            </a:r>
+            <a:r>
+              <a:rPr lang="en-US" dirty="0" err="1"/>
+              <a:t>vars</a:t>
+            </a:r>
+            <a:r>
+              <a:rPr lang="en-US" dirty="0"/>
+              <a:t>-in-</a:t>
+            </a:r>
+            <a:r>
+              <a:rPr lang="en-US" dirty="0" err="1"/>
+              <a:t>subexp</a:t>
+            </a:r>
+            <a:r>
+              <a:rPr lang="en-US" dirty="0"/>
+              <a:t> </a:t>
+            </a:r>
+            <a:endParaRPr lang="en-US" dirty="0" smtClean="0"/>
+          </a:p>
+          <a:p>
+            <a:r>
+              <a:rPr lang="en-US" dirty="0" smtClean="0"/>
+              <a:t>;;   (</a:t>
+            </a:r>
+            <a:r>
+              <a:rPr lang="en-US" dirty="0"/>
+              <a:t>z (lambda (x) (x y))) (list z)) </a:t>
+            </a:r>
+            <a:endParaRPr lang="en-US" dirty="0" smtClean="0"/>
+          </a:p>
+          <a:p>
+            <a:r>
+              <a:rPr lang="en-US" dirty="0" smtClean="0"/>
+              <a:t>;; = </a:t>
+            </a:r>
+            <a:r>
+              <a:rPr lang="en-US" dirty="0"/>
+              <a:t>(list y) </a:t>
+            </a:r>
+          </a:p>
+          <a:p>
+            <a:endParaRPr lang="en-US" dirty="0"/>
+          </a:p>
+        </p:txBody>
+      </p:sp>
+      <p:sp>
+        <p:nvSpPr>
+          <p:cNvPr id="5" name="Slide Number Placeholder 4"/>
+          <p:cNvSpPr>
+            <a:spLocks noGrp="1"/>
+          </p:cNvSpPr>
+          <p:nvPr>
+            <p:ph type="sldNum" sz="quarter" idx="12"/>
+          </p:nvPr>
+        </p:nvSpPr>
+        <p:spPr/>
+        <p:txBody>
+          <a:bodyPr/>
+          <a:lstStyle/>
+          <a:p>
+            <a:fld id="{9F4492BD-6A9C-48FC-AC76-0B4FE11194A1}" type="slidenum">
+              <a:rPr lang="en-US" smtClean="0">
+                <a:solidFill>
+                  <a:prstClr val="black">
+                    <a:tint val="75000"/>
+                  </a:prstClr>
+                </a:solidFill>
+              </a:rPr>
+              <a:pPr/>
+              <a:t>14</a:t>
+            </a:fld>
+            <a:endParaRPr lang="en-US">
+              <a:solidFill>
+                <a:prstClr val="black">
+                  <a:tint val="75000"/>
+                </a:prstClr>
+              </a:solidFill>
+            </a:endParaRPr>
+          </a:p>
+        </p:txBody>
+      </p:sp>
+      <p:sp>
+        <p:nvSpPr>
+          <p:cNvPr id="4" name="Rectangle 3"/>
+          <p:cNvSpPr/>
+          <p:nvPr/>
+        </p:nvSpPr>
+        <p:spPr>
+          <a:xfrm>
+            <a:off x="5029200" y="3962400"/>
+            <a:ext cx="3657600" cy="1219200"/>
+          </a:xfrm>
+          <a:prstGeom prst="rect">
+            <a:avLst/>
+          </a:prstGeom>
+          <a:solidFill>
+            <a:schemeClr val="accent3">
+              <a:lumMod val="40000"/>
+              <a:lumOff val="60000"/>
+            </a:schemeClr>
+          </a:solidFill>
+          <a:ln/>
+        </p:spPr>
+        <p:style>
+          <a:lnRef idx="2">
+            <a:schemeClr val="accent1"/>
+          </a:lnRef>
+          <a:fillRef idx="1">
+            <a:schemeClr val="lt1"/>
+          </a:fillRef>
+          <a:effectRef idx="0">
+            <a:schemeClr val="accent1"/>
+          </a:effectRef>
+          <a:fontRef idx="minor">
+            <a:schemeClr val="dk1"/>
+          </a:fontRef>
+        </p:style>
+        <p:txBody>
+          <a:bodyPr rot="0" spcFirstLastPara="0" vertOverflow="overflow" horzOverflow="overflow" vert="horz" wrap="square" lIns="91440" tIns="45720" rIns="91440" bIns="45720" numCol="1" spcCol="0" rtlCol="0" fromWordArt="0" anchor="ctr" anchorCtr="0" forceAA="0" compatLnSpc="1">
+            <a:prstTxWarp prst="textNoShape">
+              <a:avLst/>
+            </a:prstTxWarp>
+            <a:noAutofit/>
+          </a:bodyPr>
+          <a:lstStyle/>
+          <a:p>
+            <a:r>
+              <a:rPr lang="en-US" dirty="0" smtClean="0">
+                <a:solidFill>
+                  <a:schemeClr val="tx1"/>
+                </a:solidFill>
+              </a:rPr>
+              <a:t>We don’t know what </a:t>
+            </a:r>
+            <a:r>
+              <a:rPr lang="en-US" b="1" dirty="0" smtClean="0">
+                <a:solidFill>
+                  <a:schemeClr val="tx1"/>
+                </a:solidFill>
+              </a:rPr>
+              <a:t>f0</a:t>
+            </a:r>
+            <a:r>
+              <a:rPr lang="en-US" dirty="0" smtClean="0">
+                <a:solidFill>
+                  <a:schemeClr val="tx1"/>
+                </a:solidFill>
+              </a:rPr>
+              <a:t> is.  We only know that </a:t>
+            </a:r>
+            <a:r>
+              <a:rPr lang="en-US" b="1" dirty="0" err="1" smtClean="0">
+                <a:solidFill>
+                  <a:schemeClr val="tx1"/>
+                </a:solidFill>
+              </a:rPr>
+              <a:t>bvars</a:t>
+            </a:r>
+            <a:r>
+              <a:rPr lang="en-US" dirty="0" smtClean="0">
+                <a:solidFill>
+                  <a:schemeClr val="tx1"/>
+                </a:solidFill>
+              </a:rPr>
+              <a:t> is the list of symbols that occur above </a:t>
+            </a:r>
+            <a:r>
+              <a:rPr lang="en-US" b="1" dirty="0" smtClean="0">
+                <a:solidFill>
+                  <a:schemeClr val="tx1"/>
+                </a:solidFill>
+              </a:rPr>
+              <a:t>f</a:t>
+            </a:r>
+            <a:r>
+              <a:rPr lang="en-US" dirty="0" smtClean="0">
+                <a:solidFill>
+                  <a:schemeClr val="tx1"/>
+                </a:solidFill>
+              </a:rPr>
+              <a:t> in </a:t>
+            </a:r>
+            <a:r>
+              <a:rPr lang="en-US" b="1" dirty="0" smtClean="0">
+                <a:solidFill>
+                  <a:schemeClr val="tx1"/>
+                </a:solidFill>
+              </a:rPr>
+              <a:t>f0</a:t>
+            </a:r>
+            <a:r>
+              <a:rPr lang="en-US" dirty="0" smtClean="0">
+                <a:solidFill>
+                  <a:schemeClr val="tx1"/>
+                </a:solidFill>
+              </a:rPr>
+              <a:t>. (See Lesson 7.1, Slide 27)</a:t>
+            </a:r>
+            <a:endParaRPr lang="en-US" dirty="0">
+              <a:solidFill>
+                <a:schemeClr val="tx1"/>
+              </a:solidFill>
+            </a:endParaRPr>
+          </a:p>
+        </p:txBody>
+      </p:sp>
+    </p:spTree>
+    <p:extLst>
+      <p:ext uri="{BB962C8B-B14F-4D97-AF65-F5344CB8AC3E}">
+        <p14:creationId xmlns:p14="http://schemas.microsoft.com/office/powerpoint/2010/main" val="2506840274"/>
+      </p:ext>
+    </p:extLst>
+  </p:cSld>
+  <p:clrMapOvr>
+    <a:masterClrMapping/>
+  </p:clrMapOvr>
+  <p:timing>
+    <p:tnLst>
+      <p:par>
+        <p:cTn id="1" dur="indefinite" restart="never" nodeType="tmRoot"/>
+      </p:par>
+    </p:tnLst>
+  </p:timing>
+</p:sld>
+</file>
+
+<file path=ppt/slides/slide15.xml><?xml version="1.0" encoding="utf-8"?>
+<p:sld xmlns:a="http://schemas.openxmlformats.org/drawingml/2006/main" xmlns:r="http://schemas.openxmlformats.org/officeDocument/2006/relationships" xmlns:p="http://schemas.openxmlformats.org/presentationml/2006/main">
+  <p:cSld>
+    <p:spTree>
+      <p:nvGrpSpPr>
+        <p:cNvPr id="1" name=""/>
+        <p:cNvGrpSpPr/>
+        <p:nvPr/>
+      </p:nvGrpSpPr>
+      <p:grpSpPr>
+        <a:xfrm>
+          <a:off x="0" y="0"/>
+          <a:ext cx="0" cy="0"/>
+          <a:chOff x="0" y="0"/>
+          <a:chExt cx="0" cy="0"/>
+        </a:xfrm>
+      </p:grpSpPr>
+      <p:sp>
+        <p:nvSpPr>
+          <p:cNvPr id="2" name="Title 1"/>
+          <p:cNvSpPr>
+            <a:spLocks noGrp="1"/>
+          </p:cNvSpPr>
+          <p:nvPr>
+            <p:ph type="title"/>
+          </p:nvPr>
+        </p:nvSpPr>
+        <p:spPr/>
+        <p:txBody>
+          <a:bodyPr/>
+          <a:lstStyle/>
+          <a:p>
+            <a:r>
+              <a:rPr lang="en-US" dirty="0" smtClean="0"/>
               <a:t>Function Definition</a:t>
             </a:r>
             <a:endParaRPr lang="en-US" dirty="0"/>
@@ -6100,7 +6624,7 @@
                 </a:solidFill>
               </a:rPr>
               <a:pPr/>
-              <a:t>13</a:t>
+              <a:t>15</a:t>
             </a:fld>
             <a:endParaRPr lang="en-US">
               <a:solidFill>
@@ -6322,7 +6846,7 @@
 </p:sld>
 </file>
 
-<file path=ppt/slides/slide14.xml><?xml version="1.0" encoding="utf-8"?>
+<file path=ppt/slides/slide16.xml><?xml version="1.0" encoding="utf-8"?>
 <p:sld xmlns:a="http://schemas.openxmlformats.org/drawingml/2006/main" xmlns:r="http://schemas.openxmlformats.org/officeDocument/2006/relationships" xmlns:p="http://schemas.openxmlformats.org/presentationml/2006/main">
   <p:cSld>
     <p:spTree>
@@ -6523,7 +7047,7 @@
                 </a:solidFill>
               </a:rPr>
               <a:pPr/>
-              <a:t>14</a:t>
+              <a:t>16</a:t>
             </a:fld>
             <a:endParaRPr lang="en-US">
               <a:solidFill>
@@ -6653,7 +7177,7 @@
 </p:sld>
 </file>
 
-<file path=ppt/slides/slide15.xml><?xml version="1.0" encoding="utf-8"?>
+<file path=ppt/slides/slide17.xml><?xml version="1.0" encoding="utf-8"?>
 <p:sld xmlns:a="http://schemas.openxmlformats.org/drawingml/2006/main" xmlns:r="http://schemas.openxmlformats.org/officeDocument/2006/relationships" xmlns:p="http://schemas.openxmlformats.org/presentationml/2006/main">
   <p:cSld>
     <p:spTree>
@@ -6757,7 +7281,7 @@
                 </a:solidFill>
               </a:rPr>
               <a:pPr/>
-              <a:t>15</a:t>
+              <a:t>17</a:t>
             </a:fld>
             <a:endParaRPr lang="en-US">
               <a:solidFill>
@@ -7241,15 +7765,7 @@
                   <a:schemeClr val="tx1"/>
                 </a:solidFill>
               </a:rPr>
-              <a:t>expressions in </a:t>
-            </a:r>
-            <a:r>
-              <a:rPr lang="en-US" dirty="0" smtClean="0">
-                <a:solidFill>
-                  <a:schemeClr val="tx1"/>
-                </a:solidFill>
-              </a:rPr>
-              <a:t>Fred</a:t>
+              <a:t>expressions in Fred</a:t>
             </a:r>
             <a:r>
               <a:rPr lang="en-US" dirty="0">
@@ -8601,6 +9117,356 @@
           <a:p>
             <a:r>
               <a:rPr lang="en-US" dirty="0" smtClean="0"/>
+              <a:t>Symbols and Quotation</a:t>
+            </a:r>
+            <a:endParaRPr lang="en-US" dirty="0"/>
+          </a:p>
+        </p:txBody>
+      </p:sp>
+      <p:sp>
+        <p:nvSpPr>
+          <p:cNvPr id="5" name="Content Placeholder 4"/>
+          <p:cNvSpPr>
+            <a:spLocks noGrp="1"/>
+          </p:cNvSpPr>
+          <p:nvPr>
+            <p:ph idx="1"/>
+          </p:nvPr>
+        </p:nvSpPr>
+        <p:spPr/>
+        <p:txBody>
+          <a:bodyPr/>
+          <a:lstStyle/>
+          <a:p>
+            <a:r>
+              <a:rPr lang="en-US" dirty="0" smtClean="0"/>
+              <a:t>Our data design uses </a:t>
+            </a:r>
+            <a:r>
+              <a:rPr lang="en-US" i="1" dirty="0" smtClean="0">
+                <a:solidFill>
+                  <a:srgbClr val="FF0000"/>
+                </a:solidFill>
+              </a:rPr>
+              <a:t>symbols</a:t>
+            </a:r>
+            <a:r>
+              <a:rPr lang="en-US" dirty="0" smtClean="0"/>
+              <a:t>.</a:t>
+            </a:r>
+          </a:p>
+          <a:p>
+            <a:r>
+              <a:rPr lang="en-US" dirty="0" smtClean="0"/>
+              <a:t>A Symbol is a primitive data type in Racket.</a:t>
+            </a:r>
+          </a:p>
+          <a:p>
+            <a:r>
+              <a:rPr lang="en-US" dirty="0" smtClean="0"/>
+              <a:t>It  looks like a variable.</a:t>
+            </a:r>
+          </a:p>
+          <a:p>
+            <a:r>
+              <a:rPr lang="en-US" dirty="0" smtClean="0"/>
+              <a:t>To introduce a symbol in a piece of code, we precede it with a quote mark.  For example, </a:t>
+            </a:r>
+            <a:r>
+              <a:rPr lang="en-US" b="1" dirty="0" smtClean="0"/>
+              <a:t>'z</a:t>
+            </a:r>
+            <a:r>
+              <a:rPr lang="en-US" dirty="0" smtClean="0"/>
+              <a:t> is a Racket expression whose value is the symbol </a:t>
+            </a:r>
+            <a:r>
+              <a:rPr lang="en-US" b="1" dirty="0" smtClean="0"/>
+              <a:t>z</a:t>
+            </a:r>
+            <a:r>
+              <a:rPr lang="en-US" dirty="0" smtClean="0"/>
+              <a:t>.</a:t>
+            </a:r>
+            <a:endParaRPr lang="en-US" dirty="0"/>
+          </a:p>
+        </p:txBody>
+      </p:sp>
+      <p:sp>
+        <p:nvSpPr>
+          <p:cNvPr id="4" name="Slide Number Placeholder 3"/>
+          <p:cNvSpPr>
+            <a:spLocks noGrp="1"/>
+          </p:cNvSpPr>
+          <p:nvPr>
+            <p:ph type="sldNum" sz="quarter" idx="12"/>
+          </p:nvPr>
+        </p:nvSpPr>
+        <p:spPr/>
+        <p:txBody>
+          <a:bodyPr/>
+          <a:lstStyle/>
+          <a:p>
+            <a:fld id="{2AF3B5EA-18B6-4040-9F78-6052AF49C681}" type="slidenum">
+              <a:rPr lang="en-US" smtClean="0"/>
+              <a:t>6</a:t>
+            </a:fld>
+            <a:endParaRPr lang="en-US"/>
+          </a:p>
+        </p:txBody>
+      </p:sp>
+    </p:spTree>
+    <p:extLst>
+      <p:ext uri="{BB962C8B-B14F-4D97-AF65-F5344CB8AC3E}">
+        <p14:creationId xmlns:p14="http://schemas.microsoft.com/office/powerpoint/2010/main" val="3844425055"/>
+      </p:ext>
+    </p:extLst>
+  </p:cSld>
+  <p:clrMapOvr>
+    <a:masterClrMapping/>
+  </p:clrMapOvr>
+</p:sld>
+</file>
+
+<file path=ppt/slides/slide7.xml><?xml version="1.0" encoding="utf-8"?>
+<p:sld xmlns:a="http://schemas.openxmlformats.org/drawingml/2006/main" xmlns:r="http://schemas.openxmlformats.org/officeDocument/2006/relationships" xmlns:p="http://schemas.openxmlformats.org/presentationml/2006/main">
+  <p:cSld>
+    <p:spTree>
+      <p:nvGrpSpPr>
+        <p:cNvPr id="1" name=""/>
+        <p:cNvGrpSpPr/>
+        <p:nvPr/>
+      </p:nvGrpSpPr>
+      <p:grpSpPr>
+        <a:xfrm>
+          <a:off x="0" y="0"/>
+          <a:ext cx="0" cy="0"/>
+          <a:chOff x="0" y="0"/>
+          <a:chExt cx="0" cy="0"/>
+        </a:xfrm>
+      </p:grpSpPr>
+      <p:sp>
+        <p:nvSpPr>
+          <p:cNvPr id="2" name="Title 1"/>
+          <p:cNvSpPr>
+            <a:spLocks noGrp="1"/>
+          </p:cNvSpPr>
+          <p:nvPr>
+            <p:ph type="title"/>
+          </p:nvPr>
+        </p:nvSpPr>
+        <p:spPr/>
+        <p:txBody>
+          <a:bodyPr/>
+          <a:lstStyle/>
+          <a:p>
+            <a:r>
+              <a:rPr lang="en-US" dirty="0" smtClean="0"/>
+              <a:t>Quotation (2)</a:t>
+            </a:r>
+            <a:endParaRPr lang="en-US" dirty="0"/>
+          </a:p>
+        </p:txBody>
+      </p:sp>
+      <p:sp>
+        <p:nvSpPr>
+          <p:cNvPr id="3" name="Content Placeholder 2"/>
+          <p:cNvSpPr>
+            <a:spLocks noGrp="1"/>
+          </p:cNvSpPr>
+          <p:nvPr>
+            <p:ph idx="1"/>
+          </p:nvPr>
+        </p:nvSpPr>
+        <p:spPr/>
+        <p:txBody>
+          <a:bodyPr>
+            <a:normAutofit fontScale="70000" lnSpcReduction="20000"/>
+          </a:bodyPr>
+          <a:lstStyle/>
+          <a:p>
+            <a:r>
+              <a:rPr lang="en-US" dirty="0" smtClean="0"/>
+              <a:t>You can also use a quote in front of a list.  Quotation tells Racket that the thing that follows it is a constant whose value is a symbol or a list.  Thus</a:t>
+            </a:r>
+          </a:p>
+          <a:p>
+            <a:r>
+              <a:rPr lang="en-US" dirty="0" smtClean="0"/>
+              <a:t>Thus </a:t>
+            </a:r>
+            <a:r>
+              <a:rPr lang="en-US" b="1" dirty="0" smtClean="0"/>
+              <a:t>‘(a b c) </a:t>
+            </a:r>
+            <a:r>
+              <a:rPr lang="en-US" dirty="0" smtClean="0"/>
+              <a:t>and </a:t>
+            </a:r>
+            <a:r>
+              <a:rPr lang="en-US" b="1" dirty="0" smtClean="0"/>
+              <a:t>(list ‘a ‘b ‘c) </a:t>
+            </a:r>
+            <a:r>
+              <a:rPr lang="en-US" dirty="0" smtClean="0"/>
+              <a:t>are both Racket  expressions that denote a list whose elements are the symbols </a:t>
+            </a:r>
+            <a:r>
+              <a:rPr lang="en-US" b="1" dirty="0" smtClean="0"/>
+              <a:t>a</a:t>
+            </a:r>
+            <a:r>
+              <a:rPr lang="en-US" dirty="0" smtClean="0"/>
+              <a:t>, </a:t>
+            </a:r>
+            <a:r>
+              <a:rPr lang="en-US" b="1" dirty="0" smtClean="0"/>
+              <a:t>b</a:t>
+            </a:r>
+            <a:r>
+              <a:rPr lang="en-US" dirty="0" smtClean="0"/>
+              <a:t>, and </a:t>
+            </a:r>
+            <a:r>
+              <a:rPr lang="en-US" b="1" dirty="0" smtClean="0"/>
+              <a:t>c</a:t>
+            </a:r>
+            <a:r>
+              <a:rPr lang="en-US" dirty="0" smtClean="0"/>
+              <a:t>.</a:t>
+            </a:r>
+          </a:p>
+          <a:p>
+            <a:r>
+              <a:rPr lang="en-US" dirty="0" smtClean="0"/>
+              <a:t>On the other hand, </a:t>
+            </a:r>
+            <a:r>
+              <a:rPr lang="en-US" b="1" dirty="0" smtClean="0"/>
+              <a:t>(a b c) </a:t>
+            </a:r>
+            <a:r>
+              <a:rPr lang="en-US" dirty="0" smtClean="0"/>
+              <a:t>is a Racket expression that denotes the application of the function named </a:t>
+            </a:r>
+            <a:r>
+              <a:rPr lang="en-US" b="1" dirty="0" smtClean="0"/>
+              <a:t>a</a:t>
+            </a:r>
+            <a:r>
+              <a:rPr lang="en-US" dirty="0" smtClean="0"/>
+              <a:t> to the values of the variables </a:t>
+            </a:r>
+            <a:r>
+              <a:rPr lang="en-US" b="1" dirty="0" smtClean="0"/>
+              <a:t>b</a:t>
+            </a:r>
+            <a:r>
+              <a:rPr lang="en-US" dirty="0" smtClean="0"/>
+              <a:t> and </a:t>
+            </a:r>
+            <a:r>
+              <a:rPr lang="en-US" b="1" dirty="0" smtClean="0"/>
+              <a:t>c</a:t>
+            </a:r>
+            <a:r>
+              <a:rPr lang="en-US" dirty="0" smtClean="0"/>
+              <a:t>.</a:t>
+            </a:r>
+          </a:p>
+          <a:p>
+            <a:r>
+              <a:rPr lang="en-US" dirty="0" smtClean="0"/>
+              <a:t>This is all you need to know about symbols and quotation for right now.</a:t>
+            </a:r>
+          </a:p>
+          <a:p>
+            <a:r>
+              <a:rPr lang="en-US" dirty="0" smtClean="0"/>
+              <a:t>There is lots more detail in </a:t>
+            </a:r>
+            <a:r>
+              <a:rPr lang="en-US" dirty="0" err="1" smtClean="0"/>
+              <a:t>HtDP</a:t>
+            </a:r>
+            <a:r>
+              <a:rPr lang="en-US" dirty="0" smtClean="0"/>
+              <a:t>/2e,  in the Intermezzo entitled “Quote, Unquote”.  But that chapter covers way more than you need for this course.</a:t>
+            </a:r>
+            <a:endParaRPr lang="en-US" dirty="0"/>
+          </a:p>
+        </p:txBody>
+      </p:sp>
+      <p:sp>
+        <p:nvSpPr>
+          <p:cNvPr id="4" name="Slide Number Placeholder 3"/>
+          <p:cNvSpPr>
+            <a:spLocks noGrp="1"/>
+          </p:cNvSpPr>
+          <p:nvPr>
+            <p:ph type="sldNum" sz="quarter" idx="12"/>
+          </p:nvPr>
+        </p:nvSpPr>
+        <p:spPr/>
+        <p:txBody>
+          <a:bodyPr/>
+          <a:lstStyle/>
+          <a:p>
+            <a:fld id="{2AF3B5EA-18B6-4040-9F78-6052AF49C681}" type="slidenum">
+              <a:rPr lang="en-US" smtClean="0"/>
+              <a:t>7</a:t>
+            </a:fld>
+            <a:endParaRPr lang="en-US"/>
+          </a:p>
+        </p:txBody>
+      </p:sp>
+    </p:spTree>
+    <p:extLst>
+      <p:ext uri="{BB962C8B-B14F-4D97-AF65-F5344CB8AC3E}">
+        <p14:creationId xmlns:p14="http://schemas.microsoft.com/office/powerpoint/2010/main" val="2933446541"/>
+      </p:ext>
+    </p:extLst>
+  </p:cSld>
+  <p:clrMapOvr>
+    <a:masterClrMapping/>
+  </p:clrMapOvr>
+</p:sld>
+</file>
+
+<file path=ppt/slides/slide8.xml><?xml version="1.0" encoding="utf-8"?>
+<p:sld xmlns:a="http://schemas.openxmlformats.org/drawingml/2006/main" xmlns:r="http://schemas.openxmlformats.org/officeDocument/2006/relationships" xmlns:p="http://schemas.openxmlformats.org/presentationml/2006/main">
+  <p:cSld>
+    <p:spTree>
+      <p:nvGrpSpPr>
+        <p:cNvPr id="1" name=""/>
+        <p:cNvGrpSpPr/>
+        <p:nvPr/>
+      </p:nvGrpSpPr>
+      <p:grpSpPr>
+        <a:xfrm>
+          <a:off x="0" y="0"/>
+          <a:ext cx="0" cy="0"/>
+          <a:chOff x="0" y="0"/>
+          <a:chExt cx="0" cy="0"/>
+        </a:xfrm>
+      </p:grpSpPr>
+      <p:sp>
+        <p:nvSpPr>
+          <p:cNvPr id="2" name="Title 1"/>
+          <p:cNvSpPr>
+            <a:spLocks noGrp="1"/>
+          </p:cNvSpPr>
+          <p:nvPr>
+            <p:ph type="title"/>
+          </p:nvPr>
+        </p:nvSpPr>
+        <p:spPr/>
+        <p:txBody>
+          <a:bodyPr/>
+          <a:lstStyle/>
+          <a:p>
+            <a:r>
+              <a:rPr lang="en-US" dirty="0" smtClean="0"/>
               <a:t>Data Design (2)</a:t>
             </a:r>
             <a:endParaRPr lang="en-US" dirty="0"/>
@@ -8756,13 +9622,75 @@
                 </a:solidFill>
               </a:rPr>
               <a:pPr/>
-              <a:t>6</a:t>
+              <a:t>8</a:t>
             </a:fld>
             <a:endParaRPr lang="en-US">
               <a:solidFill>
                 <a:prstClr val="black">
                   <a:tint val="75000"/>
                 </a:prstClr>
+              </a:solidFill>
+            </a:endParaRPr>
+          </a:p>
+        </p:txBody>
+      </p:sp>
+      <p:sp>
+        <p:nvSpPr>
+          <p:cNvPr id="5" name="Rectangle 4"/>
+          <p:cNvSpPr/>
+          <p:nvPr/>
+        </p:nvSpPr>
+        <p:spPr>
+          <a:xfrm>
+            <a:off x="5562600" y="2209800"/>
+            <a:ext cx="2819400" cy="2209800"/>
+          </a:xfrm>
+          <a:prstGeom prst="rect">
+            <a:avLst/>
+          </a:prstGeom>
+          <a:solidFill>
+            <a:schemeClr val="accent3">
+              <a:lumMod val="40000"/>
+              <a:lumOff val="60000"/>
+            </a:schemeClr>
+          </a:solidFill>
+          <a:ln/>
+        </p:spPr>
+        <p:style>
+          <a:lnRef idx="2">
+            <a:schemeClr val="accent1"/>
+          </a:lnRef>
+          <a:fillRef idx="1">
+            <a:schemeClr val="lt1"/>
+          </a:fillRef>
+          <a:effectRef idx="0">
+            <a:schemeClr val="accent1"/>
+          </a:effectRef>
+          <a:fontRef idx="minor">
+            <a:schemeClr val="dk1"/>
+          </a:fontRef>
+        </p:style>
+        <p:txBody>
+          <a:bodyPr rot="0" spcFirstLastPara="0" vertOverflow="overflow" horzOverflow="overflow" vert="horz" wrap="square" lIns="91440" tIns="45720" rIns="91440" bIns="45720" numCol="1" spcCol="0" rtlCol="0" fromWordArt="0" anchor="ctr" anchorCtr="0" forceAA="0" compatLnSpc="1">
+            <a:prstTxWarp prst="textNoShape">
+              <a:avLst/>
+            </a:prstTxWarp>
+            <a:noAutofit/>
+          </a:bodyPr>
+          <a:lstStyle/>
+          <a:p>
+            <a:pPr algn="ctr"/>
+            <a:r>
+              <a:rPr lang="en-US" dirty="0" smtClean="0">
+                <a:solidFill>
+                  <a:schemeClr val="tx1"/>
+                </a:solidFill>
+              </a:rPr>
+              <a:t>Now that we’ve briefly explained about symbols and quotation, we can give an example of the representation of a Fred-expression.</a:t>
+            </a:r>
+            <a:endParaRPr lang="en-US" dirty="0">
+              <a:solidFill>
+                <a:schemeClr val="tx1"/>
               </a:solidFill>
             </a:endParaRPr>
           </a:p>
@@ -8788,7 +9716,7 @@
 </p:sld>
 </file>
 
-<file path=ppt/slides/slide7.xml><?xml version="1.0" encoding="utf-8"?>
+<file path=ppt/slides/slide9.xml><?xml version="1.0" encoding="utf-8"?>
 <p:sld xmlns:a="http://schemas.openxmlformats.org/drawingml/2006/main" xmlns:r="http://schemas.openxmlformats.org/officeDocument/2006/relationships" xmlns:p="http://schemas.openxmlformats.org/presentationml/2006/main">
   <p:cSld>
     <p:spTree>
@@ -9029,7 +9957,7 @@
                 </a:solidFill>
               </a:rPr>
               <a:pPr/>
-              <a:t>7</a:t>
+              <a:t>9</a:t>
             </a:fld>
             <a:endParaRPr lang="en-US">
               <a:solidFill>
@@ -9147,556 +10075,6 @@
     <p:extLst>
       <p:ext uri="{BB962C8B-B14F-4D97-AF65-F5344CB8AC3E}">
         <p14:creationId xmlns:p14="http://schemas.microsoft.com/office/powerpoint/2010/main" val="2466460268"/>
-      </p:ext>
-    </p:extLst>
-  </p:cSld>
-  <p:clrMapOvr>
-    <a:masterClrMapping/>
-  </p:clrMapOvr>
-  <p:timing>
-    <p:tnLst>
-      <p:par>
-        <p:cTn id="1" dur="indefinite" restart="never" nodeType="tmRoot"/>
-      </p:par>
-    </p:tnLst>
-  </p:timing>
-</p:sld>
-</file>
-
-<file path=ppt/slides/slide8.xml><?xml version="1.0" encoding="utf-8"?>
-<p:sld xmlns:a="http://schemas.openxmlformats.org/drawingml/2006/main" xmlns:r="http://schemas.openxmlformats.org/officeDocument/2006/relationships" xmlns:p="http://schemas.openxmlformats.org/presentationml/2006/main">
-  <p:cSld>
-    <p:spTree>
-      <p:nvGrpSpPr>
-        <p:cNvPr id="1" name=""/>
-        <p:cNvGrpSpPr/>
-        <p:nvPr/>
-      </p:nvGrpSpPr>
-      <p:grpSpPr>
-        <a:xfrm>
-          <a:off x="0" y="0"/>
-          <a:ext cx="0" cy="0"/>
-          <a:chOff x="0" y="0"/>
-          <a:chExt cx="0" cy="0"/>
-        </a:xfrm>
-      </p:grpSpPr>
-      <p:sp>
-        <p:nvSpPr>
-          <p:cNvPr id="2" name="Title 1"/>
-          <p:cNvSpPr>
-            <a:spLocks noGrp="1"/>
-          </p:cNvSpPr>
-          <p:nvPr>
-            <p:ph type="title"/>
-          </p:nvPr>
-        </p:nvSpPr>
-        <p:spPr/>
-        <p:txBody>
-          <a:bodyPr>
-            <a:normAutofit/>
-          </a:bodyPr>
-          <a:lstStyle/>
-          <a:p>
-            <a:r>
-              <a:rPr lang="en-US" dirty="0" smtClean="0"/>
-              <a:t>Contract &amp; purpose statement</a:t>
-            </a:r>
-            <a:endParaRPr lang="en-US" dirty="0"/>
-          </a:p>
-        </p:txBody>
-      </p:sp>
-      <p:sp>
-        <p:nvSpPr>
-          <p:cNvPr id="3" name="Content Placeholder 2"/>
-          <p:cNvSpPr>
-            <a:spLocks noGrp="1"/>
-          </p:cNvSpPr>
-          <p:nvPr>
-            <p:ph idx="1"/>
-          </p:nvPr>
-        </p:nvSpPr>
-        <p:spPr/>
-        <p:txBody>
-          <a:bodyPr>
-            <a:normAutofit/>
-          </a:bodyPr>
-          <a:lstStyle/>
-          <a:p>
-            <a:r>
-              <a:rPr lang="en-US" sz="2400" dirty="0" smtClean="0"/>
-              <a:t>;; free-</a:t>
-            </a:r>
-            <a:r>
-              <a:rPr lang="en-US" sz="2400" dirty="0" err="1" smtClean="0"/>
-              <a:t>vars</a:t>
-            </a:r>
-            <a:r>
-              <a:rPr lang="en-US" sz="2400" dirty="0" smtClean="0"/>
-              <a:t> : </a:t>
-            </a:r>
-            <a:r>
-              <a:rPr lang="en-US" sz="2400" dirty="0" err="1" smtClean="0"/>
-              <a:t>FredExp</a:t>
-            </a:r>
-            <a:r>
-              <a:rPr lang="en-US" sz="2400" dirty="0" smtClean="0"/>
-              <a:t> -&gt; </a:t>
-            </a:r>
-            <a:r>
-              <a:rPr lang="en-US" sz="2400" dirty="0" err="1" smtClean="0"/>
-              <a:t>SetOfSymbol</a:t>
-            </a:r>
-            <a:endParaRPr lang="en-US" sz="2400" dirty="0" smtClean="0"/>
-          </a:p>
-          <a:p>
-            <a:r>
-              <a:rPr lang="en-US" sz="2400" dirty="0" smtClean="0"/>
-              <a:t>;; Produces the set of names that occur free in the given </a:t>
-            </a:r>
-            <a:r>
-              <a:rPr lang="en-US" sz="2400" dirty="0" err="1" smtClean="0"/>
-              <a:t>FredExp</a:t>
-            </a:r>
-            <a:endParaRPr lang="en-US" sz="2400" dirty="0" smtClean="0"/>
-          </a:p>
-          <a:p>
-            <a:r>
-              <a:rPr lang="en-US" sz="2400" dirty="0" smtClean="0"/>
-              <a:t>;; EXAMPLE:</a:t>
-            </a:r>
-          </a:p>
-          <a:p>
-            <a:r>
-              <a:rPr lang="en-US" sz="2400" dirty="0" smtClean="0"/>
-              <a:t>;; (free-</a:t>
-            </a:r>
-            <a:r>
-              <a:rPr lang="en-US" sz="2400" dirty="0" err="1" smtClean="0"/>
-              <a:t>vars</a:t>
-            </a:r>
-            <a:r>
-              <a:rPr lang="en-US" sz="2400" dirty="0" smtClean="0"/>
-              <a:t> (z (lambda (x) (x y)))) = {y, z}</a:t>
-            </a:r>
-          </a:p>
-          <a:p>
-            <a:r>
-              <a:rPr lang="en-US" sz="2400" dirty="0" smtClean="0"/>
-              <a:t>;; strategy: Use template for </a:t>
-            </a:r>
-            <a:r>
-              <a:rPr lang="en-US" sz="2400" dirty="0" err="1" smtClean="0"/>
-              <a:t>FredExp</a:t>
-            </a:r>
-            <a:endParaRPr lang="en-US" sz="2400" dirty="0" smtClean="0"/>
-          </a:p>
-          <a:p>
-            <a:endParaRPr lang="en-US" sz="2400" dirty="0" smtClean="0"/>
-          </a:p>
-          <a:p>
-            <a:r>
-              <a:rPr lang="en-US" b="0" dirty="0" smtClean="0">
-                <a:latin typeface="+mn-lt"/>
-              </a:rPr>
-              <a:t>We will represent sets as lists without duplication, as in sets.rkt.</a:t>
-            </a:r>
-            <a:endParaRPr lang="en-US" b="0" dirty="0">
-              <a:latin typeface="+mn-lt"/>
-            </a:endParaRPr>
-          </a:p>
-        </p:txBody>
-      </p:sp>
-      <p:sp>
-        <p:nvSpPr>
-          <p:cNvPr id="4" name="Slide Number Placeholder 3"/>
-          <p:cNvSpPr>
-            <a:spLocks noGrp="1"/>
-          </p:cNvSpPr>
-          <p:nvPr>
-            <p:ph type="sldNum" sz="quarter" idx="12"/>
-          </p:nvPr>
-        </p:nvSpPr>
-        <p:spPr/>
-        <p:txBody>
-          <a:bodyPr/>
-          <a:lstStyle/>
-          <a:p>
-            <a:fld id="{9F4492BD-6A9C-48FC-AC76-0B4FE11194A1}" type="slidenum">
-              <a:rPr lang="en-US" smtClean="0">
-                <a:solidFill>
-                  <a:prstClr val="black">
-                    <a:tint val="75000"/>
-                  </a:prstClr>
-                </a:solidFill>
-              </a:rPr>
-              <a:pPr/>
-              <a:t>8</a:t>
-            </a:fld>
-            <a:endParaRPr lang="en-US">
-              <a:solidFill>
-                <a:prstClr val="black">
-                  <a:tint val="75000"/>
-                </a:prstClr>
-              </a:solidFill>
-            </a:endParaRPr>
-          </a:p>
-        </p:txBody>
-      </p:sp>
-    </p:spTree>
-    <p:extLst>
-      <p:ext uri="{BB962C8B-B14F-4D97-AF65-F5344CB8AC3E}">
-        <p14:creationId xmlns:p14="http://schemas.microsoft.com/office/powerpoint/2010/main" val="4258390618"/>
-      </p:ext>
-    </p:extLst>
-  </p:cSld>
-  <p:clrMapOvr>
-    <a:masterClrMapping/>
-  </p:clrMapOvr>
-  <p:timing>
-    <p:tnLst>
-      <p:par>
-        <p:cTn id="1" dur="indefinite" restart="never" nodeType="tmRoot"/>
-      </p:par>
-    </p:tnLst>
-  </p:timing>
-</p:sld>
-</file>
-
-<file path=ppt/slides/slide9.xml><?xml version="1.0" encoding="utf-8"?>
-<p:sld xmlns:a="http://schemas.openxmlformats.org/drawingml/2006/main" xmlns:r="http://schemas.openxmlformats.org/officeDocument/2006/relationships" xmlns:p="http://schemas.openxmlformats.org/presentationml/2006/main">
-  <p:cSld>
-    <p:spTree>
-      <p:nvGrpSpPr>
-        <p:cNvPr id="1" name=""/>
-        <p:cNvGrpSpPr/>
-        <p:nvPr/>
-      </p:nvGrpSpPr>
-      <p:grpSpPr>
-        <a:xfrm>
-          <a:off x="0" y="0"/>
-          <a:ext cx="0" cy="0"/>
-          <a:chOff x="0" y="0"/>
-          <a:chExt cx="0" cy="0"/>
-        </a:xfrm>
-      </p:grpSpPr>
-      <p:sp>
-        <p:nvSpPr>
-          <p:cNvPr id="6" name="Title 5"/>
-          <p:cNvSpPr>
-            <a:spLocks noGrp="1"/>
-          </p:cNvSpPr>
-          <p:nvPr>
-            <p:ph type="title"/>
-          </p:nvPr>
-        </p:nvSpPr>
-        <p:spPr/>
-        <p:txBody>
-          <a:bodyPr/>
-          <a:lstStyle/>
-          <a:p>
-            <a:r>
-              <a:rPr lang="en-US" dirty="0" smtClean="0"/>
-              <a:t>Here's the template again</a:t>
-            </a:r>
-            <a:endParaRPr lang="en-US" dirty="0"/>
-          </a:p>
-        </p:txBody>
-      </p:sp>
-      <p:sp>
-        <p:nvSpPr>
-          <p:cNvPr id="7" name="Content Placeholder 6"/>
-          <p:cNvSpPr>
-            <a:spLocks noGrp="1"/>
-          </p:cNvSpPr>
-          <p:nvPr>
-            <p:ph idx="1"/>
-          </p:nvPr>
-        </p:nvSpPr>
-        <p:spPr/>
-        <p:txBody>
-          <a:bodyPr>
-            <a:normAutofit fontScale="77500" lnSpcReduction="20000"/>
-          </a:bodyPr>
-          <a:lstStyle/>
-          <a:p>
-            <a:r>
-              <a:rPr lang="en-US" dirty="0"/>
-              <a:t>;; </a:t>
-            </a:r>
-            <a:r>
-              <a:rPr lang="en-US" dirty="0" err="1"/>
-              <a:t>fredexp-fn</a:t>
-            </a:r>
-            <a:r>
-              <a:rPr lang="en-US" dirty="0"/>
-              <a:t> : </a:t>
-            </a:r>
-            <a:r>
-              <a:rPr lang="en-US" dirty="0" err="1"/>
-              <a:t>FredExp</a:t>
-            </a:r>
-            <a:r>
-              <a:rPr lang="en-US" dirty="0"/>
-              <a:t> -&gt; ?</a:t>
-            </a:r>
-          </a:p>
-          <a:p>
-            <a:r>
-              <a:rPr lang="en-US" dirty="0"/>
-              <a:t>#;</a:t>
-            </a:r>
-          </a:p>
-          <a:p>
-            <a:r>
-              <a:rPr lang="en-US" dirty="0"/>
-              <a:t>(define (</a:t>
-            </a:r>
-            <a:r>
-              <a:rPr lang="en-US" dirty="0" err="1"/>
-              <a:t>fredexp-fn</a:t>
-            </a:r>
-            <a:r>
-              <a:rPr lang="en-US" dirty="0"/>
-              <a:t> f)</a:t>
-            </a:r>
-          </a:p>
-          <a:p>
-            <a:r>
-              <a:rPr lang="en-US" dirty="0"/>
-              <a:t>  (</a:t>
-            </a:r>
-            <a:r>
-              <a:rPr lang="en-US" dirty="0" err="1"/>
-              <a:t>cond</a:t>
-            </a:r>
-            <a:endParaRPr lang="en-US" dirty="0"/>
-          </a:p>
-          <a:p>
-            <a:r>
-              <a:rPr lang="en-US" dirty="0"/>
-              <a:t>    [(</a:t>
-            </a:r>
-            <a:r>
-              <a:rPr lang="en-US" dirty="0" err="1"/>
-              <a:t>var</a:t>
-            </a:r>
-            <a:r>
-              <a:rPr lang="en-US" dirty="0"/>
-              <a:t>? f) (... (</a:t>
-            </a:r>
-            <a:r>
-              <a:rPr lang="en-US" dirty="0" err="1"/>
-              <a:t>var</a:t>
-            </a:r>
-            <a:r>
-              <a:rPr lang="en-US" dirty="0"/>
-              <a:t>-name f))]</a:t>
-            </a:r>
-          </a:p>
-          <a:p>
-            <a:r>
-              <a:rPr lang="en-US" dirty="0"/>
-              <a:t>    [(lam? f) (...</a:t>
-            </a:r>
-          </a:p>
-          <a:p>
-            <a:r>
-              <a:rPr lang="en-US" dirty="0"/>
-              <a:t>                (lam-</a:t>
-            </a:r>
-            <a:r>
-              <a:rPr lang="en-US" dirty="0" err="1"/>
-              <a:t>var</a:t>
-            </a:r>
-            <a:r>
-              <a:rPr lang="en-US" dirty="0"/>
-              <a:t> f)</a:t>
-            </a:r>
-          </a:p>
-          <a:p>
-            <a:r>
-              <a:rPr lang="en-US" dirty="0"/>
-              <a:t>                (</a:t>
-            </a:r>
-            <a:r>
-              <a:rPr lang="en-US" dirty="0" err="1"/>
-              <a:t>fredexp-fn</a:t>
-            </a:r>
-            <a:r>
-              <a:rPr lang="en-US" dirty="0"/>
-              <a:t> (lam-body f)))]</a:t>
-            </a:r>
-          </a:p>
-          <a:p>
-            <a:r>
-              <a:rPr lang="en-US" dirty="0"/>
-              <a:t>    [(app? f) (...</a:t>
-            </a:r>
-          </a:p>
-          <a:p>
-            <a:r>
-              <a:rPr lang="en-US" dirty="0"/>
-              <a:t>                (</a:t>
-            </a:r>
-            <a:r>
-              <a:rPr lang="en-US" dirty="0" err="1"/>
-              <a:t>fredexp-fn</a:t>
-            </a:r>
-            <a:r>
-              <a:rPr lang="en-US" dirty="0"/>
-              <a:t> (app-</a:t>
-            </a:r>
-            <a:r>
-              <a:rPr lang="en-US" dirty="0" err="1"/>
-              <a:t>fn</a:t>
-            </a:r>
-            <a:r>
-              <a:rPr lang="en-US" dirty="0"/>
-              <a:t> f))</a:t>
-            </a:r>
-          </a:p>
-          <a:p>
-            <a:r>
-              <a:rPr lang="en-US" dirty="0"/>
-              <a:t>                (</a:t>
-            </a:r>
-            <a:r>
-              <a:rPr lang="en-US" dirty="0" err="1"/>
-              <a:t>fredexp-fn</a:t>
-            </a:r>
-            <a:r>
-              <a:rPr lang="en-US" dirty="0"/>
-              <a:t> (app-</a:t>
-            </a:r>
-            <a:r>
-              <a:rPr lang="en-US" dirty="0" err="1"/>
-              <a:t>arg</a:t>
-            </a:r>
-            <a:r>
-              <a:rPr lang="en-US" dirty="0"/>
-              <a:t> f)))]))</a:t>
-            </a:r>
-          </a:p>
-        </p:txBody>
-      </p:sp>
-      <p:sp>
-        <p:nvSpPr>
-          <p:cNvPr id="3" name="Slide Number Placeholder 2"/>
-          <p:cNvSpPr>
-            <a:spLocks noGrp="1"/>
-          </p:cNvSpPr>
-          <p:nvPr>
-            <p:ph type="sldNum" sz="quarter" idx="12"/>
-          </p:nvPr>
-        </p:nvSpPr>
-        <p:spPr/>
-        <p:txBody>
-          <a:bodyPr/>
-          <a:lstStyle/>
-          <a:p>
-            <a:fld id="{9F4492BD-6A9C-48FC-AC76-0B4FE11194A1}" type="slidenum">
-              <a:rPr lang="en-US" smtClean="0">
-                <a:solidFill>
-                  <a:prstClr val="black">
-                    <a:tint val="75000"/>
-                  </a:prstClr>
-                </a:solidFill>
-              </a:rPr>
-              <a:pPr/>
-              <a:t>9</a:t>
-            </a:fld>
-            <a:endParaRPr lang="en-US">
-              <a:solidFill>
-                <a:prstClr val="black">
-                  <a:tint val="75000"/>
-                </a:prstClr>
-              </a:solidFill>
-            </a:endParaRPr>
-          </a:p>
-        </p:txBody>
-      </p:sp>
-      <p:sp>
-        <p:nvSpPr>
-          <p:cNvPr id="5" name="Rectangle 4"/>
-          <p:cNvSpPr/>
-          <p:nvPr/>
-        </p:nvSpPr>
-        <p:spPr>
-          <a:xfrm>
-            <a:off x="6553200" y="2133600"/>
-            <a:ext cx="2362200" cy="1601787"/>
-          </a:xfrm>
-          <a:prstGeom prst="rect">
-            <a:avLst/>
-          </a:prstGeom>
-          <a:solidFill>
-            <a:schemeClr val="accent3">
-              <a:lumMod val="40000"/>
-              <a:lumOff val="60000"/>
-            </a:schemeClr>
-          </a:solidFill>
-          <a:ln/>
-        </p:spPr>
-        <p:style>
-          <a:lnRef idx="2">
-            <a:schemeClr val="accent1"/>
-          </a:lnRef>
-          <a:fillRef idx="1">
-            <a:schemeClr val="lt1"/>
-          </a:fillRef>
-          <a:effectRef idx="0">
-            <a:schemeClr val="accent1"/>
-          </a:effectRef>
-          <a:fontRef idx="minor">
-            <a:schemeClr val="dk1"/>
-          </a:fontRef>
-        </p:style>
-        <p:txBody>
-          <a:bodyPr rot="0" spcFirstLastPara="0" vertOverflow="overflow" horzOverflow="overflow" vert="horz" wrap="square" lIns="91440" tIns="45720" rIns="91440" bIns="45720" numCol="1" spcCol="0" rtlCol="0" fromWordArt="0" anchor="ctr" anchorCtr="0" forceAA="0" compatLnSpc="1">
-            <a:prstTxWarp prst="textNoShape">
-              <a:avLst/>
-            </a:prstTxWarp>
-            <a:noAutofit/>
-          </a:bodyPr>
-          <a:lstStyle/>
-          <a:p>
-            <a:pPr algn="ctr"/>
-            <a:r>
-              <a:rPr lang="en-US" sz="2400" dirty="0" smtClean="0">
-                <a:solidFill>
-                  <a:schemeClr val="tx1"/>
-                </a:solidFill>
-              </a:rPr>
-              <a:t>What </a:t>
-            </a:r>
-            <a:r>
-              <a:rPr lang="en-US" sz="2400" dirty="0" smtClean="0">
-                <a:solidFill>
-                  <a:schemeClr val="tx1"/>
-                </a:solidFill>
-              </a:rPr>
-              <a:t>happens as </a:t>
-            </a:r>
-            <a:r>
-              <a:rPr lang="en-US" sz="2400" dirty="0" smtClean="0">
-                <a:solidFill>
-                  <a:schemeClr val="tx1"/>
-                </a:solidFill>
-              </a:rPr>
-              <a:t>we descend into the structure?</a:t>
-            </a:r>
-            <a:endParaRPr lang="en-US" sz="2400" dirty="0">
-              <a:solidFill>
-                <a:schemeClr val="tx1"/>
-              </a:solidFill>
-            </a:endParaRPr>
-          </a:p>
-        </p:txBody>
-      </p:sp>
-    </p:spTree>
-    <p:extLst>
-      <p:ext uri="{BB962C8B-B14F-4D97-AF65-F5344CB8AC3E}">
-        <p14:creationId xmlns:p14="http://schemas.microsoft.com/office/powerpoint/2010/main" val="3696768219"/>
       </p:ext>
     </p:extLst>
   </p:cSld>

</xml_diff>